<commit_message>
added LTR user guide
</commit_message>
<xml_diff>
--- a/ltr/images/ltr_images.pptx
+++ b/ltr/images/ltr_images.pptx
@@ -6,6 +6,7 @@
   </p:sldMasterIdLst>
   <p:sldIdLst>
     <p:sldId id="256" r:id="rId2"/>
+    <p:sldId id="257" r:id="rId3"/>
   </p:sldIdLst>
   <p:sldSz cx="9144000" cy="6858000" type="screen4x3"/>
   <p:notesSz cx="6858000" cy="9144000"/>
@@ -106,7 +107,7 @@
   </p:defaultTextStyle>
   <p:extLst>
     <p:ext uri="{EFAFB233-063F-42B5-8137-9DF3F51BA10A}">
-      <p15:sldGuideLst xmlns:p15="http://schemas.microsoft.com/office/powerpoint/2012/main">
+      <p15:sldGuideLst xmlns:p15="http://schemas.microsoft.com/office/powerpoint/2012/main" xmlns="">
         <p15:guide id="1" orient="horz" pos="2160">
           <p15:clr>
             <a:srgbClr val="A4A3A4"/>
@@ -304,7 +305,7 @@
           <a:p>
             <a:fld id="{E90ED720-0104-4369-84BC-D37694168613}" type="datetimeFigureOut">
               <a:rPr kumimoji="1" lang="ja-JP" altLang="en-US" smtClean="0"/>
-              <a:t>2016/8/22</a:t>
+              <a:t>2016/11/15</a:t>
             </a:fld>
             <a:endParaRPr kumimoji="1" lang="ja-JP" altLang="en-US"/>
           </a:p>
@@ -501,7 +502,7 @@
           <a:p>
             <a:fld id="{E90ED720-0104-4369-84BC-D37694168613}" type="datetimeFigureOut">
               <a:rPr kumimoji="1" lang="ja-JP" altLang="en-US" smtClean="0"/>
-              <a:t>2016/8/22</a:t>
+              <a:t>2016/11/15</a:t>
             </a:fld>
             <a:endParaRPr kumimoji="1" lang="ja-JP" altLang="en-US"/>
           </a:p>
@@ -708,7 +709,7 @@
           <a:p>
             <a:fld id="{E90ED720-0104-4369-84BC-D37694168613}" type="datetimeFigureOut">
               <a:rPr kumimoji="1" lang="ja-JP" altLang="en-US" smtClean="0"/>
-              <a:t>2016/8/22</a:t>
+              <a:t>2016/11/15</a:t>
             </a:fld>
             <a:endParaRPr kumimoji="1" lang="ja-JP" altLang="en-US"/>
           </a:p>
@@ -905,7 +906,7 @@
           <a:p>
             <a:fld id="{E90ED720-0104-4369-84BC-D37694168613}" type="datetimeFigureOut">
               <a:rPr kumimoji="1" lang="ja-JP" altLang="en-US" smtClean="0"/>
-              <a:t>2016/8/22</a:t>
+              <a:t>2016/11/15</a:t>
             </a:fld>
             <a:endParaRPr kumimoji="1" lang="ja-JP" altLang="en-US"/>
           </a:p>
@@ -1146,7 +1147,7 @@
           <a:p>
             <a:fld id="{E90ED720-0104-4369-84BC-D37694168613}" type="datetimeFigureOut">
               <a:rPr kumimoji="1" lang="ja-JP" altLang="en-US" smtClean="0"/>
-              <a:t>2016/8/22</a:t>
+              <a:t>2016/11/15</a:t>
             </a:fld>
             <a:endParaRPr kumimoji="1" lang="ja-JP" altLang="en-US"/>
           </a:p>
@@ -1493,7 +1494,7 @@
           <a:p>
             <a:fld id="{E90ED720-0104-4369-84BC-D37694168613}" type="datetimeFigureOut">
               <a:rPr kumimoji="1" lang="ja-JP" altLang="en-US" smtClean="0"/>
-              <a:t>2016/8/22</a:t>
+              <a:t>2016/11/15</a:t>
             </a:fld>
             <a:endParaRPr kumimoji="1" lang="ja-JP" altLang="en-US"/>
           </a:p>
@@ -1974,7 +1975,7 @@
           <a:p>
             <a:fld id="{E90ED720-0104-4369-84BC-D37694168613}" type="datetimeFigureOut">
               <a:rPr kumimoji="1" lang="ja-JP" altLang="en-US" smtClean="0"/>
-              <a:t>2016/8/22</a:t>
+              <a:t>2016/11/15</a:t>
             </a:fld>
             <a:endParaRPr kumimoji="1" lang="ja-JP" altLang="en-US"/>
           </a:p>
@@ -2087,7 +2088,7 @@
           <a:p>
             <a:fld id="{E90ED720-0104-4369-84BC-D37694168613}" type="datetimeFigureOut">
               <a:rPr kumimoji="1" lang="ja-JP" altLang="en-US" smtClean="0"/>
-              <a:t>2016/8/22</a:t>
+              <a:t>2016/11/15</a:t>
             </a:fld>
             <a:endParaRPr kumimoji="1" lang="ja-JP" altLang="en-US"/>
           </a:p>
@@ -2177,7 +2178,7 @@
           <a:p>
             <a:fld id="{E90ED720-0104-4369-84BC-D37694168613}" type="datetimeFigureOut">
               <a:rPr kumimoji="1" lang="ja-JP" altLang="en-US" smtClean="0"/>
-              <a:t>2016/8/22</a:t>
+              <a:t>2016/11/15</a:t>
             </a:fld>
             <a:endParaRPr kumimoji="1" lang="ja-JP" altLang="en-US"/>
           </a:p>
@@ -2481,7 +2482,7 @@
           <a:p>
             <a:fld id="{E90ED720-0104-4369-84BC-D37694168613}" type="datetimeFigureOut">
               <a:rPr kumimoji="1" lang="ja-JP" altLang="en-US" smtClean="0"/>
-              <a:t>2016/8/22</a:t>
+              <a:t>2016/11/15</a:t>
             </a:fld>
             <a:endParaRPr kumimoji="1" lang="ja-JP" altLang="en-US"/>
           </a:p>
@@ -2729,7 +2730,7 @@
           <a:p>
             <a:fld id="{E90ED720-0104-4369-84BC-D37694168613}" type="datetimeFigureOut">
               <a:rPr kumimoji="1" lang="ja-JP" altLang="en-US" smtClean="0"/>
-              <a:t>2016/8/22</a:t>
+              <a:t>2016/11/15</a:t>
             </a:fld>
             <a:endParaRPr kumimoji="1" lang="ja-JP" altLang="en-US"/>
           </a:p>
@@ -2969,7 +2970,7 @@
           <a:p>
             <a:fld id="{E90ED720-0104-4369-84BC-D37694168613}" type="datetimeFigureOut">
               <a:rPr kumimoji="1" lang="ja-JP" altLang="en-US" smtClean="0"/>
-              <a:t>2016/8/22</a:t>
+              <a:t>2016/11/15</a:t>
             </a:fld>
             <a:endParaRPr kumimoji="1" lang="ja-JP" altLang="en-US"/>
           </a:p>
@@ -3683,8 +3684,8 @@
         </p:nvSpPr>
         <p:spPr>
           <a:xfrm>
-            <a:off x="1851597" y="2014779"/>
-            <a:ext cx="1299500" cy="757200"/>
+            <a:off x="1851596" y="2014779"/>
+            <a:ext cx="1362451" cy="757200"/>
           </a:xfrm>
           <a:prstGeom prst="homePlate">
             <a:avLst>
@@ -3723,9 +3724,10 @@
               <a:buNone/>
             </a:pPr>
             <a:r>
-              <a:rPr lang="ja"/>
-              <a:t>Supervise</a:t>
-            </a:r>
+              <a:rPr lang="en-US" altLang="ja" dirty="0" smtClean="0"/>
+              <a:t>Annotation</a:t>
+            </a:r>
+            <a:endParaRPr lang="ja" dirty="0"/>
           </a:p>
         </p:txBody>
       </p:sp>
@@ -4072,8 +4074,12 @@
               <a:buNone/>
             </a:pPr>
             <a:r>
-              <a:rPr lang="ja"/>
-              <a:t>Model creation</a:t>
+              <a:rPr lang="ja" dirty="0" smtClean="0"/>
+              <a:t>Model </a:t>
+            </a:r>
+            <a:r>
+              <a:rPr lang="ja" dirty="0"/>
+              <a:t>creation</a:t>
             </a:r>
           </a:p>
         </p:txBody>
@@ -4356,10 +4362,10 @@
           <a:lstStyle/>
           <a:p>
             <a:r>
-              <a:rPr kumimoji="1" lang="en-US" altLang="ja-JP" sz="1200"/>
-              <a:t>Supervisers</a:t>
-            </a:r>
-            <a:endParaRPr kumimoji="1" lang="ja-JP" altLang="en-US" sz="1200"/>
+              <a:rPr kumimoji="1" lang="en-US" altLang="ja-JP" sz="1200" dirty="0" smtClean="0"/>
+              <a:t>Annotators</a:t>
+            </a:r>
+            <a:endParaRPr kumimoji="1" lang="ja-JP" altLang="en-US" sz="1200" dirty="0"/>
           </a:p>
         </p:txBody>
       </p:sp>
@@ -5036,6 +5042,3099 @@
   <p:clrMapOvr>
     <a:masterClrMapping/>
   </p:clrMapOvr>
+  <p:timing>
+    <p:tnLst>
+      <p:par>
+        <p:cTn id="1" dur="indefinite" restart="never" nodeType="tmRoot"/>
+      </p:par>
+    </p:tnLst>
+  </p:timing>
+</p:sld>
+</file>
+
+<file path=ppt/slides/slide2.xml><?xml version="1.0" encoding="utf-8"?>
+<p:sld xmlns:a="http://schemas.openxmlformats.org/drawingml/2006/main" xmlns:r="http://schemas.openxmlformats.org/officeDocument/2006/relationships" xmlns:p="http://schemas.openxmlformats.org/presentationml/2006/main">
+  <p:cSld>
+    <p:spTree>
+      <p:nvGrpSpPr>
+        <p:cNvPr id="1" name=""/>
+        <p:cNvGrpSpPr/>
+        <p:nvPr/>
+      </p:nvGrpSpPr>
+      <p:grpSpPr>
+        <a:xfrm>
+          <a:off x="0" y="0"/>
+          <a:ext cx="0" cy="0"/>
+          <a:chOff x="0" y="0"/>
+          <a:chExt cx="0" cy="0"/>
+        </a:xfrm>
+      </p:grpSpPr>
+      <p:sp>
+        <p:nvSpPr>
+          <p:cNvPr id="2" name="タイトル 1"/>
+          <p:cNvSpPr>
+            <a:spLocks noGrp="1"/>
+          </p:cNvSpPr>
+          <p:nvPr>
+            <p:ph type="title"/>
+          </p:nvPr>
+        </p:nvSpPr>
+        <p:spPr/>
+        <p:txBody>
+          <a:bodyPr>
+            <a:normAutofit/>
+          </a:bodyPr>
+          <a:lstStyle/>
+          <a:p>
+            <a:r>
+              <a:rPr lang="en-US" altLang="ja-JP" dirty="0" smtClean="0"/>
+              <a:t>LTR</a:t>
+            </a:r>
+            <a:r>
+              <a:rPr kumimoji="1" lang="en-US" altLang="ja-JP" dirty="0" smtClean="0"/>
+              <a:t>: </a:t>
+            </a:r>
+            <a:r>
+              <a:rPr kumimoji="1" lang="en-US" altLang="ja-JP" dirty="0" smtClean="0"/>
+              <a:t>Architecture Overview</a:t>
+            </a:r>
+            <a:endParaRPr kumimoji="1" lang="ja-JP" altLang="en-US" dirty="0"/>
+          </a:p>
+        </p:txBody>
+      </p:sp>
+      <p:sp>
+        <p:nvSpPr>
+          <p:cNvPr id="96" name="正方形/長方形 95"/>
+          <p:cNvSpPr/>
+          <p:nvPr/>
+        </p:nvSpPr>
+        <p:spPr>
+          <a:xfrm>
+            <a:off x="629392" y="2570455"/>
+            <a:ext cx="8063346" cy="2127011"/>
+          </a:xfrm>
+          <a:prstGeom prst="rect">
+            <a:avLst/>
+          </a:prstGeom>
+          <a:solidFill>
+            <a:schemeClr val="bg2"/>
+          </a:solidFill>
+          <a:ln>
+            <a:solidFill>
+              <a:schemeClr val="tx1">
+                <a:lumMod val="75000"/>
+                <a:lumOff val="25000"/>
+              </a:schemeClr>
+            </a:solidFill>
+          </a:ln>
+        </p:spPr>
+        <p:style>
+          <a:lnRef idx="2">
+            <a:schemeClr val="accent1">
+              <a:shade val="50000"/>
+            </a:schemeClr>
+          </a:lnRef>
+          <a:fillRef idx="1">
+            <a:schemeClr val="accent1"/>
+          </a:fillRef>
+          <a:effectRef idx="0">
+            <a:schemeClr val="accent1"/>
+          </a:effectRef>
+          <a:fontRef idx="minor">
+            <a:schemeClr val="lt1"/>
+          </a:fontRef>
+        </p:style>
+        <p:txBody>
+          <a:bodyPr rot="0" spcFirstLastPara="0" vertOverflow="overflow" horzOverflow="overflow" vert="horz" wrap="square" lIns="91440" tIns="45720" rIns="91440" bIns="45720" numCol="1" spcCol="0" rtlCol="0" fromWordArt="0" anchor="ctr" anchorCtr="0" forceAA="0" compatLnSpc="1">
+            <a:prstTxWarp prst="textNoShape">
+              <a:avLst/>
+            </a:prstTxWarp>
+            <a:noAutofit/>
+          </a:bodyPr>
+          <a:lstStyle/>
+          <a:p>
+            <a:pPr algn="ctr"/>
+            <a:endParaRPr kumimoji="1" lang="en-US" altLang="ja-JP" b="1" dirty="0" smtClean="0">
+              <a:solidFill>
+                <a:schemeClr val="tx1">
+                  <a:lumMod val="75000"/>
+                  <a:lumOff val="25000"/>
+                </a:schemeClr>
+              </a:solidFill>
+            </a:endParaRPr>
+          </a:p>
+        </p:txBody>
+      </p:sp>
+      <p:sp>
+        <p:nvSpPr>
+          <p:cNvPr id="98" name="メモ 97"/>
+          <p:cNvSpPr/>
+          <p:nvPr/>
+        </p:nvSpPr>
+        <p:spPr>
+          <a:xfrm>
+            <a:off x="1008177" y="1652795"/>
+            <a:ext cx="1218467" cy="619231"/>
+          </a:xfrm>
+          <a:prstGeom prst="foldedCorner">
+            <a:avLst/>
+          </a:prstGeom>
+          <a:solidFill>
+            <a:schemeClr val="bg2"/>
+          </a:solidFill>
+          <a:ln>
+            <a:solidFill>
+              <a:schemeClr val="tx1">
+                <a:lumMod val="65000"/>
+                <a:lumOff val="35000"/>
+              </a:schemeClr>
+            </a:solidFill>
+          </a:ln>
+        </p:spPr>
+        <p:style>
+          <a:lnRef idx="2">
+            <a:schemeClr val="accent1">
+              <a:shade val="50000"/>
+            </a:schemeClr>
+          </a:lnRef>
+          <a:fillRef idx="1">
+            <a:schemeClr val="accent1"/>
+          </a:fillRef>
+          <a:effectRef idx="0">
+            <a:schemeClr val="accent1"/>
+          </a:effectRef>
+          <a:fontRef idx="minor">
+            <a:schemeClr val="lt1"/>
+          </a:fontRef>
+        </p:style>
+        <p:txBody>
+          <a:bodyPr rtlCol="0" anchor="ctr"/>
+          <a:lstStyle/>
+          <a:p>
+            <a:pPr algn="ctr"/>
+            <a:r>
+              <a:rPr lang="en-US" altLang="ja-JP" sz="1400" dirty="0" smtClean="0">
+                <a:solidFill>
+                  <a:schemeClr val="tx1">
+                    <a:lumMod val="75000"/>
+                    <a:lumOff val="25000"/>
+                  </a:schemeClr>
+                </a:solidFill>
+              </a:rPr>
+              <a:t>Query List</a:t>
+            </a:r>
+          </a:p>
+          <a:p>
+            <a:pPr algn="ctr"/>
+            <a:r>
+              <a:rPr lang="en-US" altLang="ja-JP" sz="1400" dirty="0" smtClean="0">
+                <a:solidFill>
+                  <a:schemeClr val="tx1">
+                    <a:lumMod val="75000"/>
+                    <a:lumOff val="25000"/>
+                  </a:schemeClr>
+                </a:solidFill>
+              </a:rPr>
+              <a:t>for evaluation</a:t>
+            </a:r>
+            <a:endParaRPr lang="en-US" altLang="ja-JP" sz="1400" dirty="0" smtClean="0">
+              <a:solidFill>
+                <a:schemeClr val="tx1">
+                  <a:lumMod val="75000"/>
+                  <a:lumOff val="25000"/>
+                </a:schemeClr>
+              </a:solidFill>
+            </a:endParaRPr>
+          </a:p>
+        </p:txBody>
+      </p:sp>
+      <p:cxnSp>
+        <p:nvCxnSpPr>
+          <p:cNvPr id="99" name="カギ線コネクタ 98"/>
+          <p:cNvCxnSpPr>
+            <a:stCxn id="98" idx="2"/>
+            <a:endCxn id="80" idx="0"/>
+          </p:cNvCxnSpPr>
+          <p:nvPr/>
+        </p:nvCxnSpPr>
+        <p:spPr>
+          <a:xfrm rot="16200000" flipH="1">
+            <a:off x="1477585" y="2411852"/>
+            <a:ext cx="749003" cy="469350"/>
+          </a:xfrm>
+          <a:prstGeom prst="bentConnector3">
+            <a:avLst>
+              <a:gd name="adj1" fmla="val 50000"/>
+            </a:avLst>
+          </a:prstGeom>
+          <a:ln w="15875">
+            <a:solidFill>
+              <a:schemeClr val="tx1">
+                <a:lumMod val="75000"/>
+                <a:lumOff val="25000"/>
+              </a:schemeClr>
+            </a:solidFill>
+            <a:tailEnd type="arrow"/>
+          </a:ln>
+        </p:spPr>
+        <p:style>
+          <a:lnRef idx="1">
+            <a:schemeClr val="accent1"/>
+          </a:lnRef>
+          <a:fillRef idx="0">
+            <a:schemeClr val="accent1"/>
+          </a:fillRef>
+          <a:effectRef idx="0">
+            <a:schemeClr val="accent1"/>
+          </a:effectRef>
+          <a:fontRef idx="minor">
+            <a:schemeClr val="tx1"/>
+          </a:fontRef>
+        </p:style>
+      </p:cxnSp>
+      <p:grpSp>
+        <p:nvGrpSpPr>
+          <p:cNvPr id="103" name="グループ化 102"/>
+          <p:cNvGrpSpPr/>
+          <p:nvPr/>
+        </p:nvGrpSpPr>
+        <p:grpSpPr>
+          <a:xfrm>
+            <a:off x="4143489" y="1676545"/>
+            <a:ext cx="294681" cy="533309"/>
+            <a:chOff x="7229647" y="1574794"/>
+            <a:chExt cx="150665" cy="299283"/>
+          </a:xfrm>
+        </p:grpSpPr>
+        <p:sp>
+          <p:nvSpPr>
+            <p:cNvPr id="104" name="フローチャート : 結合子 103"/>
+            <p:cNvSpPr/>
+            <p:nvPr/>
+          </p:nvSpPr>
+          <p:spPr>
+            <a:xfrm>
+              <a:off x="7229647" y="1574794"/>
+              <a:ext cx="150418" cy="126014"/>
+            </a:xfrm>
+            <a:prstGeom prst="flowChartConnector">
+              <a:avLst/>
+            </a:prstGeom>
+            <a:solidFill>
+              <a:schemeClr val="bg1"/>
+            </a:solidFill>
+            <a:ln w="12700">
+              <a:solidFill>
+                <a:schemeClr val="tx1">
+                  <a:lumMod val="75000"/>
+                  <a:lumOff val="25000"/>
+                </a:schemeClr>
+              </a:solidFill>
+            </a:ln>
+          </p:spPr>
+          <p:style>
+            <a:lnRef idx="2">
+              <a:schemeClr val="accent1">
+                <a:shade val="50000"/>
+              </a:schemeClr>
+            </a:lnRef>
+            <a:fillRef idx="1">
+              <a:schemeClr val="accent1"/>
+            </a:fillRef>
+            <a:effectRef idx="0">
+              <a:schemeClr val="accent1"/>
+            </a:effectRef>
+            <a:fontRef idx="minor">
+              <a:schemeClr val="lt1"/>
+            </a:fontRef>
+          </p:style>
+          <p:txBody>
+            <a:bodyPr rot="0" spcFirstLastPara="0" vertOverflow="overflow" horzOverflow="overflow" vert="horz" wrap="square" lIns="91440" tIns="45720" rIns="91440" bIns="45720" numCol="1" spcCol="0" rtlCol="0" fromWordArt="0" anchor="ctr" anchorCtr="0" forceAA="0" compatLnSpc="1">
+              <a:prstTxWarp prst="textNoShape">
+                <a:avLst/>
+              </a:prstTxWarp>
+              <a:noAutofit/>
+            </a:bodyPr>
+            <a:lstStyle/>
+            <a:p>
+              <a:pPr algn="ctr"/>
+              <a:endParaRPr kumimoji="1" lang="ja-JP" altLang="en-US" dirty="0" smtClean="0">
+                <a:solidFill>
+                  <a:schemeClr val="tx1">
+                    <a:lumMod val="75000"/>
+                    <a:lumOff val="25000"/>
+                  </a:schemeClr>
+                </a:solidFill>
+              </a:endParaRPr>
+            </a:p>
+          </p:txBody>
+        </p:sp>
+        <p:cxnSp>
+          <p:nvCxnSpPr>
+            <p:cNvPr id="105" name="直線コネクタ 104"/>
+            <p:cNvCxnSpPr/>
+            <p:nvPr/>
+          </p:nvCxnSpPr>
+          <p:spPr>
+            <a:xfrm>
+              <a:off x="7229647" y="1759314"/>
+              <a:ext cx="150418" cy="0"/>
+            </a:xfrm>
+            <a:prstGeom prst="line">
+              <a:avLst/>
+            </a:prstGeom>
+            <a:ln w="12700">
+              <a:solidFill>
+                <a:schemeClr val="tx1">
+                  <a:lumMod val="75000"/>
+                  <a:lumOff val="25000"/>
+                </a:schemeClr>
+              </a:solidFill>
+              <a:tailEnd type="none"/>
+            </a:ln>
+          </p:spPr>
+          <p:style>
+            <a:lnRef idx="1">
+              <a:schemeClr val="accent1"/>
+            </a:lnRef>
+            <a:fillRef idx="0">
+              <a:schemeClr val="accent1"/>
+            </a:fillRef>
+            <a:effectRef idx="0">
+              <a:schemeClr val="accent1"/>
+            </a:effectRef>
+            <a:fontRef idx="minor">
+              <a:schemeClr val="tx1"/>
+            </a:fontRef>
+          </p:style>
+        </p:cxnSp>
+        <p:cxnSp>
+          <p:nvCxnSpPr>
+            <p:cNvPr id="106" name="直線コネクタ 105"/>
+            <p:cNvCxnSpPr>
+              <a:stCxn id="104" idx="4"/>
+            </p:cNvCxnSpPr>
+            <p:nvPr/>
+          </p:nvCxnSpPr>
+          <p:spPr>
+            <a:xfrm>
+              <a:off x="7304856" y="1700808"/>
+              <a:ext cx="1" cy="117013"/>
+            </a:xfrm>
+            <a:prstGeom prst="line">
+              <a:avLst/>
+            </a:prstGeom>
+            <a:ln w="12700">
+              <a:solidFill>
+                <a:schemeClr val="tx1">
+                  <a:lumMod val="75000"/>
+                  <a:lumOff val="25000"/>
+                </a:schemeClr>
+              </a:solidFill>
+              <a:tailEnd type="none"/>
+            </a:ln>
+          </p:spPr>
+          <p:style>
+            <a:lnRef idx="1">
+              <a:schemeClr val="accent1"/>
+            </a:lnRef>
+            <a:fillRef idx="0">
+              <a:schemeClr val="accent1"/>
+            </a:fillRef>
+            <a:effectRef idx="0">
+              <a:schemeClr val="accent1"/>
+            </a:effectRef>
+            <a:fontRef idx="minor">
+              <a:schemeClr val="tx1"/>
+            </a:fontRef>
+          </p:style>
+        </p:cxnSp>
+        <p:cxnSp>
+          <p:nvCxnSpPr>
+            <p:cNvPr id="107" name="直線コネクタ 106"/>
+            <p:cNvCxnSpPr/>
+            <p:nvPr/>
+          </p:nvCxnSpPr>
+          <p:spPr>
+            <a:xfrm flipH="1">
+              <a:off x="7229647" y="1808820"/>
+              <a:ext cx="75210" cy="65257"/>
+            </a:xfrm>
+            <a:prstGeom prst="line">
+              <a:avLst/>
+            </a:prstGeom>
+            <a:ln w="12700">
+              <a:solidFill>
+                <a:schemeClr val="tx1">
+                  <a:lumMod val="75000"/>
+                  <a:lumOff val="25000"/>
+                </a:schemeClr>
+              </a:solidFill>
+              <a:tailEnd type="none"/>
+            </a:ln>
+          </p:spPr>
+          <p:style>
+            <a:lnRef idx="1">
+              <a:schemeClr val="accent1"/>
+            </a:lnRef>
+            <a:fillRef idx="0">
+              <a:schemeClr val="accent1"/>
+            </a:fillRef>
+            <a:effectRef idx="0">
+              <a:schemeClr val="accent1"/>
+            </a:effectRef>
+            <a:fontRef idx="minor">
+              <a:schemeClr val="tx1"/>
+            </a:fontRef>
+          </p:style>
+        </p:cxnSp>
+        <p:cxnSp>
+          <p:nvCxnSpPr>
+            <p:cNvPr id="108" name="直線コネクタ 107"/>
+            <p:cNvCxnSpPr/>
+            <p:nvPr/>
+          </p:nvCxnSpPr>
+          <p:spPr>
+            <a:xfrm>
+              <a:off x="7304857" y="1808820"/>
+              <a:ext cx="75455" cy="65257"/>
+            </a:xfrm>
+            <a:prstGeom prst="line">
+              <a:avLst/>
+            </a:prstGeom>
+            <a:ln w="12700">
+              <a:solidFill>
+                <a:schemeClr val="tx1">
+                  <a:lumMod val="75000"/>
+                  <a:lumOff val="25000"/>
+                </a:schemeClr>
+              </a:solidFill>
+              <a:tailEnd type="none"/>
+            </a:ln>
+          </p:spPr>
+          <p:style>
+            <a:lnRef idx="1">
+              <a:schemeClr val="accent1"/>
+            </a:lnRef>
+            <a:fillRef idx="0">
+              <a:schemeClr val="accent1"/>
+            </a:fillRef>
+            <a:effectRef idx="0">
+              <a:schemeClr val="accent1"/>
+            </a:effectRef>
+            <a:fontRef idx="minor">
+              <a:schemeClr val="tx1"/>
+            </a:fontRef>
+          </p:style>
+        </p:cxnSp>
+      </p:grpSp>
+      <p:sp>
+        <p:nvSpPr>
+          <p:cNvPr id="109" name="角丸四角形 108"/>
+          <p:cNvSpPr/>
+          <p:nvPr/>
+        </p:nvSpPr>
+        <p:spPr>
+          <a:xfrm>
+            <a:off x="876783" y="3016044"/>
+            <a:ext cx="639202" cy="532481"/>
+          </a:xfrm>
+          <a:prstGeom prst="roundRect">
+            <a:avLst/>
+          </a:prstGeom>
+          <a:solidFill>
+            <a:schemeClr val="accent3">
+              <a:lumMod val="20000"/>
+              <a:lumOff val="80000"/>
+            </a:schemeClr>
+          </a:solidFill>
+          <a:ln w="9525">
+            <a:solidFill>
+              <a:schemeClr val="tx1">
+                <a:lumMod val="75000"/>
+                <a:lumOff val="25000"/>
+              </a:schemeClr>
+            </a:solidFill>
+          </a:ln>
+        </p:spPr>
+        <p:style>
+          <a:lnRef idx="2">
+            <a:schemeClr val="accent1">
+              <a:shade val="50000"/>
+            </a:schemeClr>
+          </a:lnRef>
+          <a:fillRef idx="1">
+            <a:schemeClr val="accent1"/>
+          </a:fillRef>
+          <a:effectRef idx="0">
+            <a:schemeClr val="accent1"/>
+          </a:effectRef>
+          <a:fontRef idx="minor">
+            <a:schemeClr val="lt1"/>
+          </a:fontRef>
+        </p:style>
+        <p:txBody>
+          <a:bodyPr rot="0" spcFirstLastPara="0" vertOverflow="overflow" horzOverflow="overflow" vert="horz" wrap="square" lIns="91440" tIns="45720" rIns="91440" bIns="45720" numCol="1" spcCol="0" rtlCol="0" fromWordArt="0" anchor="ctr" anchorCtr="0" forceAA="0" compatLnSpc="1">
+            <a:prstTxWarp prst="textNoShape">
+              <a:avLst/>
+            </a:prstTxWarp>
+            <a:noAutofit/>
+          </a:bodyPr>
+          <a:lstStyle/>
+          <a:p>
+            <a:pPr algn="ctr"/>
+            <a:r>
+              <a:rPr kumimoji="1" lang="en-US" altLang="ja-JP" sz="1200" dirty="0" err="1" smtClean="0">
+                <a:solidFill>
+                  <a:schemeClr val="tx1">
+                    <a:lumMod val="75000"/>
+                    <a:lumOff val="25000"/>
+                  </a:schemeClr>
+                </a:solidFill>
+              </a:rPr>
+              <a:t>Config</a:t>
+            </a:r>
+            <a:endParaRPr kumimoji="1" lang="ja-JP" altLang="en-US" sz="1200" dirty="0" smtClean="0">
+              <a:solidFill>
+                <a:schemeClr val="tx1">
+                  <a:lumMod val="75000"/>
+                  <a:lumOff val="25000"/>
+                </a:schemeClr>
+              </a:solidFill>
+            </a:endParaRPr>
+          </a:p>
+        </p:txBody>
+      </p:sp>
+      <p:cxnSp>
+        <p:nvCxnSpPr>
+          <p:cNvPr id="118" name="直線矢印コネクタ 117"/>
+          <p:cNvCxnSpPr/>
+          <p:nvPr/>
+        </p:nvCxnSpPr>
+        <p:spPr>
+          <a:xfrm flipH="1">
+            <a:off x="4287505" y="2277065"/>
+            <a:ext cx="1" cy="191568"/>
+          </a:xfrm>
+          <a:prstGeom prst="straightConnector1">
+            <a:avLst/>
+          </a:prstGeom>
+          <a:ln w="15875">
+            <a:solidFill>
+              <a:schemeClr val="tx1">
+                <a:lumMod val="75000"/>
+                <a:lumOff val="25000"/>
+              </a:schemeClr>
+            </a:solidFill>
+            <a:tailEnd type="arrow"/>
+          </a:ln>
+        </p:spPr>
+        <p:style>
+          <a:lnRef idx="1">
+            <a:schemeClr val="accent1"/>
+          </a:lnRef>
+          <a:fillRef idx="0">
+            <a:schemeClr val="accent1"/>
+          </a:fillRef>
+          <a:effectRef idx="0">
+            <a:schemeClr val="accent1"/>
+          </a:effectRef>
+          <a:fontRef idx="minor">
+            <a:schemeClr val="tx1"/>
+          </a:fontRef>
+        </p:style>
+      </p:cxnSp>
+      <p:sp>
+        <p:nvSpPr>
+          <p:cNvPr id="124" name="正方形/長方形 123"/>
+          <p:cNvSpPr/>
+          <p:nvPr/>
+        </p:nvSpPr>
+        <p:spPr>
+          <a:xfrm>
+            <a:off x="790087" y="4821383"/>
+            <a:ext cx="7810825" cy="1014874"/>
+          </a:xfrm>
+          <a:prstGeom prst="rect">
+            <a:avLst/>
+          </a:prstGeom>
+          <a:solidFill>
+            <a:schemeClr val="bg2"/>
+          </a:solidFill>
+          <a:ln>
+            <a:solidFill>
+              <a:schemeClr val="tx1">
+                <a:lumMod val="75000"/>
+                <a:lumOff val="25000"/>
+              </a:schemeClr>
+            </a:solidFill>
+          </a:ln>
+        </p:spPr>
+        <p:style>
+          <a:lnRef idx="2">
+            <a:schemeClr val="accent1">
+              <a:shade val="50000"/>
+            </a:schemeClr>
+          </a:lnRef>
+          <a:fillRef idx="1">
+            <a:schemeClr val="accent1"/>
+          </a:fillRef>
+          <a:effectRef idx="0">
+            <a:schemeClr val="accent1"/>
+          </a:effectRef>
+          <a:fontRef idx="minor">
+            <a:schemeClr val="lt1"/>
+          </a:fontRef>
+        </p:style>
+        <p:txBody>
+          <a:bodyPr rot="0" spcFirstLastPara="0" vertOverflow="overflow" horzOverflow="overflow" vert="horz" wrap="square" lIns="91440" tIns="45720" rIns="91440" bIns="45720" numCol="1" spcCol="0" rtlCol="0" fromWordArt="0" anchor="ctr" anchorCtr="0" forceAA="0" compatLnSpc="1">
+            <a:prstTxWarp prst="textNoShape">
+              <a:avLst/>
+            </a:prstTxWarp>
+            <a:noAutofit/>
+          </a:bodyPr>
+          <a:lstStyle/>
+          <a:p>
+            <a:pPr algn="ctr"/>
+            <a:endParaRPr lang="en-US" altLang="ja-JP" dirty="0" smtClean="0">
+              <a:solidFill>
+                <a:schemeClr val="tx1">
+                  <a:lumMod val="75000"/>
+                  <a:lumOff val="25000"/>
+                </a:schemeClr>
+              </a:solidFill>
+            </a:endParaRPr>
+          </a:p>
+          <a:p>
+            <a:pPr algn="ctr"/>
+            <a:endParaRPr lang="en-US" altLang="ja-JP" dirty="0">
+              <a:solidFill>
+                <a:schemeClr val="tx1">
+                  <a:lumMod val="75000"/>
+                  <a:lumOff val="25000"/>
+                </a:schemeClr>
+              </a:solidFill>
+            </a:endParaRPr>
+          </a:p>
+        </p:txBody>
+      </p:sp>
+      <p:cxnSp>
+        <p:nvCxnSpPr>
+          <p:cNvPr id="146" name="カギ線コネクタ 145"/>
+          <p:cNvCxnSpPr>
+            <a:stCxn id="75" idx="1"/>
+            <a:endCxn id="109" idx="2"/>
+          </p:cNvCxnSpPr>
+          <p:nvPr/>
+        </p:nvCxnSpPr>
+        <p:spPr>
+          <a:xfrm rot="5400000" flipH="1" flipV="1">
+            <a:off x="885994" y="3758653"/>
+            <a:ext cx="520517" cy="100263"/>
+          </a:xfrm>
+          <a:prstGeom prst="bentConnector3">
+            <a:avLst>
+              <a:gd name="adj1" fmla="val 50000"/>
+            </a:avLst>
+          </a:prstGeom>
+          <a:ln w="12700">
+            <a:solidFill>
+              <a:schemeClr val="tx1">
+                <a:lumMod val="75000"/>
+                <a:lumOff val="25000"/>
+              </a:schemeClr>
+            </a:solidFill>
+            <a:headEnd type="arrow"/>
+            <a:tailEnd type="arrow"/>
+          </a:ln>
+        </p:spPr>
+        <p:style>
+          <a:lnRef idx="1">
+            <a:schemeClr val="accent1"/>
+          </a:lnRef>
+          <a:fillRef idx="0">
+            <a:schemeClr val="accent1"/>
+          </a:fillRef>
+          <a:effectRef idx="0">
+            <a:schemeClr val="accent1"/>
+          </a:effectRef>
+          <a:fontRef idx="minor">
+            <a:schemeClr val="tx1"/>
+          </a:fontRef>
+        </p:style>
+      </p:cxnSp>
+      <p:sp>
+        <p:nvSpPr>
+          <p:cNvPr id="75" name="円柱 74"/>
+          <p:cNvSpPr/>
+          <p:nvPr/>
+        </p:nvSpPr>
+        <p:spPr>
+          <a:xfrm>
+            <a:off x="790087" y="4069042"/>
+            <a:ext cx="612068" cy="504511"/>
+          </a:xfrm>
+          <a:prstGeom prst="can">
+            <a:avLst/>
+          </a:prstGeom>
+          <a:solidFill>
+            <a:schemeClr val="bg2"/>
+          </a:solidFill>
+          <a:ln>
+            <a:solidFill>
+              <a:schemeClr val="tx1">
+                <a:lumMod val="75000"/>
+                <a:lumOff val="25000"/>
+              </a:schemeClr>
+            </a:solidFill>
+          </a:ln>
+        </p:spPr>
+        <p:style>
+          <a:lnRef idx="2">
+            <a:schemeClr val="accent1">
+              <a:shade val="50000"/>
+            </a:schemeClr>
+          </a:lnRef>
+          <a:fillRef idx="1">
+            <a:schemeClr val="accent1"/>
+          </a:fillRef>
+          <a:effectRef idx="0">
+            <a:schemeClr val="accent1"/>
+          </a:effectRef>
+          <a:fontRef idx="minor">
+            <a:schemeClr val="lt1"/>
+          </a:fontRef>
+        </p:style>
+        <p:txBody>
+          <a:bodyPr rtlCol="0" anchor="ctr"/>
+          <a:lstStyle/>
+          <a:p>
+            <a:pPr algn="ctr"/>
+            <a:r>
+              <a:rPr kumimoji="1" lang="en-US" altLang="ja-JP" sz="1200" dirty="0" err="1" smtClean="0">
+                <a:solidFill>
+                  <a:schemeClr val="tx1">
+                    <a:lumMod val="75000"/>
+                    <a:lumOff val="25000"/>
+                  </a:schemeClr>
+                </a:solidFill>
+              </a:rPr>
+              <a:t>Config</a:t>
+            </a:r>
+            <a:endParaRPr kumimoji="1" lang="ja-JP" altLang="en-US" sz="1200" dirty="0">
+              <a:solidFill>
+                <a:schemeClr val="tx1">
+                  <a:lumMod val="75000"/>
+                  <a:lumOff val="25000"/>
+                </a:schemeClr>
+              </a:solidFill>
+            </a:endParaRPr>
+          </a:p>
+        </p:txBody>
+      </p:sp>
+      <p:sp>
+        <p:nvSpPr>
+          <p:cNvPr id="80" name="角丸四角形 79"/>
+          <p:cNvSpPr/>
+          <p:nvPr/>
+        </p:nvSpPr>
+        <p:spPr>
+          <a:xfrm>
+            <a:off x="1767160" y="3021029"/>
+            <a:ext cx="639202" cy="505921"/>
+          </a:xfrm>
+          <a:prstGeom prst="roundRect">
+            <a:avLst/>
+          </a:prstGeom>
+          <a:solidFill>
+            <a:schemeClr val="accent3">
+              <a:lumMod val="20000"/>
+              <a:lumOff val="80000"/>
+            </a:schemeClr>
+          </a:solidFill>
+          <a:ln w="9525">
+            <a:solidFill>
+              <a:schemeClr val="tx1">
+                <a:lumMod val="75000"/>
+                <a:lumOff val="25000"/>
+              </a:schemeClr>
+            </a:solidFill>
+          </a:ln>
+        </p:spPr>
+        <p:style>
+          <a:lnRef idx="2">
+            <a:schemeClr val="accent1">
+              <a:shade val="50000"/>
+            </a:schemeClr>
+          </a:lnRef>
+          <a:fillRef idx="1">
+            <a:schemeClr val="accent1"/>
+          </a:fillRef>
+          <a:effectRef idx="0">
+            <a:schemeClr val="accent1"/>
+          </a:effectRef>
+          <a:fontRef idx="minor">
+            <a:schemeClr val="lt1"/>
+          </a:fontRef>
+        </p:style>
+        <p:txBody>
+          <a:bodyPr rot="0" spcFirstLastPara="0" vertOverflow="overflow" horzOverflow="overflow" vert="horz" wrap="square" lIns="91440" tIns="45720" rIns="91440" bIns="45720" numCol="1" spcCol="0" rtlCol="0" fromWordArt="0" anchor="ctr" anchorCtr="0" forceAA="0" compatLnSpc="1">
+            <a:prstTxWarp prst="textNoShape">
+              <a:avLst/>
+            </a:prstTxWarp>
+            <a:noAutofit/>
+          </a:bodyPr>
+          <a:lstStyle/>
+          <a:p>
+            <a:pPr algn="ctr"/>
+            <a:r>
+              <a:rPr kumimoji="1" lang="en-US" altLang="ja-JP" sz="1200" dirty="0" smtClean="0">
+                <a:solidFill>
+                  <a:schemeClr val="tx1">
+                    <a:lumMod val="75000"/>
+                    <a:lumOff val="25000"/>
+                  </a:schemeClr>
+                </a:solidFill>
+              </a:rPr>
+              <a:t>Query</a:t>
+            </a:r>
+          </a:p>
+          <a:p>
+            <a:pPr algn="ctr"/>
+            <a:r>
+              <a:rPr lang="en-US" altLang="ja-JP" sz="1200" dirty="0" smtClean="0">
+                <a:solidFill>
+                  <a:schemeClr val="tx1">
+                    <a:lumMod val="75000"/>
+                    <a:lumOff val="25000"/>
+                  </a:schemeClr>
+                </a:solidFill>
+              </a:rPr>
+              <a:t>List</a:t>
+            </a:r>
+            <a:endParaRPr kumimoji="1" lang="ja-JP" altLang="en-US" sz="1200" dirty="0" smtClean="0">
+              <a:solidFill>
+                <a:schemeClr val="tx1">
+                  <a:lumMod val="75000"/>
+                  <a:lumOff val="25000"/>
+                </a:schemeClr>
+              </a:solidFill>
+            </a:endParaRPr>
+          </a:p>
+        </p:txBody>
+      </p:sp>
+      <p:sp>
+        <p:nvSpPr>
+          <p:cNvPr id="82" name="角丸四角形 81"/>
+          <p:cNvSpPr/>
+          <p:nvPr/>
+        </p:nvSpPr>
+        <p:spPr>
+          <a:xfrm>
+            <a:off x="2635462" y="3009153"/>
+            <a:ext cx="1259644" cy="532481"/>
+          </a:xfrm>
+          <a:prstGeom prst="roundRect">
+            <a:avLst/>
+          </a:prstGeom>
+          <a:solidFill>
+            <a:schemeClr val="accent3">
+              <a:lumMod val="20000"/>
+              <a:lumOff val="80000"/>
+            </a:schemeClr>
+          </a:solidFill>
+          <a:ln w="9525">
+            <a:solidFill>
+              <a:schemeClr val="tx1">
+                <a:lumMod val="75000"/>
+                <a:lumOff val="25000"/>
+              </a:schemeClr>
+            </a:solidFill>
+          </a:ln>
+        </p:spPr>
+        <p:style>
+          <a:lnRef idx="2">
+            <a:schemeClr val="accent1">
+              <a:shade val="50000"/>
+            </a:schemeClr>
+          </a:lnRef>
+          <a:fillRef idx="1">
+            <a:schemeClr val="accent1"/>
+          </a:fillRef>
+          <a:effectRef idx="0">
+            <a:schemeClr val="accent1"/>
+          </a:effectRef>
+          <a:fontRef idx="minor">
+            <a:schemeClr val="lt1"/>
+          </a:fontRef>
+        </p:style>
+        <p:txBody>
+          <a:bodyPr rot="0" spcFirstLastPara="0" vertOverflow="overflow" horzOverflow="overflow" vert="horz" wrap="square" lIns="91440" tIns="45720" rIns="91440" bIns="45720" numCol="1" spcCol="0" rtlCol="0" fromWordArt="0" anchor="ctr" anchorCtr="0" forceAA="0" compatLnSpc="1">
+            <a:prstTxWarp prst="textNoShape">
+              <a:avLst/>
+            </a:prstTxWarp>
+            <a:noAutofit/>
+          </a:bodyPr>
+          <a:lstStyle/>
+          <a:p>
+            <a:pPr algn="ctr"/>
+            <a:r>
+              <a:rPr kumimoji="1" lang="en-US" altLang="ja-JP" sz="1200" dirty="0" smtClean="0">
+                <a:solidFill>
+                  <a:schemeClr val="tx1">
+                    <a:lumMod val="75000"/>
+                    <a:lumOff val="25000"/>
+                  </a:schemeClr>
+                </a:solidFill>
+              </a:rPr>
+              <a:t>Annotation</a:t>
+            </a:r>
+            <a:endParaRPr kumimoji="1" lang="ja-JP" altLang="en-US" sz="1200" dirty="0" smtClean="0">
+              <a:solidFill>
+                <a:schemeClr val="tx1">
+                  <a:lumMod val="75000"/>
+                  <a:lumOff val="25000"/>
+                </a:schemeClr>
+              </a:solidFill>
+            </a:endParaRPr>
+          </a:p>
+        </p:txBody>
+      </p:sp>
+      <p:sp>
+        <p:nvSpPr>
+          <p:cNvPr id="83" name="角丸四角形 82"/>
+          <p:cNvSpPr/>
+          <p:nvPr/>
+        </p:nvSpPr>
+        <p:spPr>
+          <a:xfrm>
+            <a:off x="4520711" y="3021029"/>
+            <a:ext cx="1256588" cy="505921"/>
+          </a:xfrm>
+          <a:prstGeom prst="roundRect">
+            <a:avLst/>
+          </a:prstGeom>
+          <a:solidFill>
+            <a:schemeClr val="accent3">
+              <a:lumMod val="20000"/>
+              <a:lumOff val="80000"/>
+            </a:schemeClr>
+          </a:solidFill>
+          <a:ln w="9525">
+            <a:solidFill>
+              <a:schemeClr val="tx1">
+                <a:lumMod val="75000"/>
+                <a:lumOff val="25000"/>
+              </a:schemeClr>
+            </a:solidFill>
+          </a:ln>
+        </p:spPr>
+        <p:style>
+          <a:lnRef idx="2">
+            <a:schemeClr val="accent1">
+              <a:shade val="50000"/>
+            </a:schemeClr>
+          </a:lnRef>
+          <a:fillRef idx="1">
+            <a:schemeClr val="accent1"/>
+          </a:fillRef>
+          <a:effectRef idx="0">
+            <a:schemeClr val="accent1"/>
+          </a:effectRef>
+          <a:fontRef idx="minor">
+            <a:schemeClr val="lt1"/>
+          </a:fontRef>
+        </p:style>
+        <p:txBody>
+          <a:bodyPr rot="0" spcFirstLastPara="0" vertOverflow="overflow" horzOverflow="overflow" vert="horz" wrap="square" lIns="91440" tIns="45720" rIns="91440" bIns="45720" numCol="1" spcCol="0" rtlCol="0" fromWordArt="0" anchor="ctr" anchorCtr="0" forceAA="0" compatLnSpc="1">
+            <a:prstTxWarp prst="textNoShape">
+              <a:avLst/>
+            </a:prstTxWarp>
+            <a:noAutofit/>
+          </a:bodyPr>
+          <a:lstStyle/>
+          <a:p>
+            <a:pPr algn="ctr"/>
+            <a:r>
+              <a:rPr kumimoji="1" lang="en-US" altLang="ja-JP" sz="1200" dirty="0" smtClean="0">
+                <a:solidFill>
+                  <a:schemeClr val="tx1">
+                    <a:lumMod val="75000"/>
+                    <a:lumOff val="25000"/>
+                  </a:schemeClr>
+                </a:solidFill>
+              </a:rPr>
+              <a:t>Feature</a:t>
+            </a:r>
+          </a:p>
+          <a:p>
+            <a:pPr algn="ctr"/>
+            <a:r>
+              <a:rPr lang="en-US" altLang="ja-JP" sz="1200" dirty="0" smtClean="0">
+                <a:solidFill>
+                  <a:schemeClr val="tx1">
+                    <a:lumMod val="75000"/>
+                    <a:lumOff val="25000"/>
+                  </a:schemeClr>
+                </a:solidFill>
+              </a:rPr>
+              <a:t>extraction</a:t>
+            </a:r>
+            <a:endParaRPr kumimoji="1" lang="ja-JP" altLang="en-US" sz="1200" dirty="0" smtClean="0">
+              <a:solidFill>
+                <a:schemeClr val="tx1">
+                  <a:lumMod val="75000"/>
+                  <a:lumOff val="25000"/>
+                </a:schemeClr>
+              </a:solidFill>
+            </a:endParaRPr>
+          </a:p>
+        </p:txBody>
+      </p:sp>
+      <p:sp>
+        <p:nvSpPr>
+          <p:cNvPr id="84" name="角丸四角形 83"/>
+          <p:cNvSpPr/>
+          <p:nvPr/>
+        </p:nvSpPr>
+        <p:spPr>
+          <a:xfrm>
+            <a:off x="6171643" y="3021029"/>
+            <a:ext cx="1352475" cy="503745"/>
+          </a:xfrm>
+          <a:prstGeom prst="roundRect">
+            <a:avLst/>
+          </a:prstGeom>
+          <a:solidFill>
+            <a:schemeClr val="accent3">
+              <a:lumMod val="20000"/>
+              <a:lumOff val="80000"/>
+            </a:schemeClr>
+          </a:solidFill>
+          <a:ln w="9525">
+            <a:solidFill>
+              <a:schemeClr val="tx1">
+                <a:lumMod val="75000"/>
+                <a:lumOff val="25000"/>
+              </a:schemeClr>
+            </a:solidFill>
+          </a:ln>
+        </p:spPr>
+        <p:style>
+          <a:lnRef idx="2">
+            <a:schemeClr val="accent1">
+              <a:shade val="50000"/>
+            </a:schemeClr>
+          </a:lnRef>
+          <a:fillRef idx="1">
+            <a:schemeClr val="accent1"/>
+          </a:fillRef>
+          <a:effectRef idx="0">
+            <a:schemeClr val="accent1"/>
+          </a:effectRef>
+          <a:fontRef idx="minor">
+            <a:schemeClr val="lt1"/>
+          </a:fontRef>
+        </p:style>
+        <p:txBody>
+          <a:bodyPr rot="0" spcFirstLastPara="0" vertOverflow="overflow" horzOverflow="overflow" vert="horz" wrap="square" lIns="91440" tIns="45720" rIns="91440" bIns="45720" numCol="1" spcCol="0" rtlCol="0" fromWordArt="0" anchor="ctr" anchorCtr="0" forceAA="0" compatLnSpc="1">
+            <a:prstTxWarp prst="textNoShape">
+              <a:avLst/>
+            </a:prstTxWarp>
+            <a:noAutofit/>
+          </a:bodyPr>
+          <a:lstStyle/>
+          <a:p>
+            <a:pPr algn="ctr"/>
+            <a:r>
+              <a:rPr kumimoji="1" lang="en-US" altLang="ja-JP" sz="1200" dirty="0" smtClean="0">
+                <a:solidFill>
+                  <a:schemeClr val="tx1">
+                    <a:lumMod val="75000"/>
+                    <a:lumOff val="25000"/>
+                  </a:schemeClr>
+                </a:solidFill>
+              </a:rPr>
+              <a:t>Train and</a:t>
+            </a:r>
+          </a:p>
+          <a:p>
+            <a:pPr algn="ctr"/>
+            <a:r>
+              <a:rPr lang="en-US" altLang="ja-JP" sz="1200" dirty="0" smtClean="0">
+                <a:solidFill>
+                  <a:schemeClr val="tx1">
+                    <a:lumMod val="75000"/>
+                    <a:lumOff val="25000"/>
+                  </a:schemeClr>
+                </a:solidFill>
+              </a:rPr>
+              <a:t>Model creation</a:t>
+            </a:r>
+            <a:endParaRPr kumimoji="1" lang="ja-JP" altLang="en-US" sz="1200" dirty="0" smtClean="0">
+              <a:solidFill>
+                <a:schemeClr val="tx1">
+                  <a:lumMod val="75000"/>
+                  <a:lumOff val="25000"/>
+                </a:schemeClr>
+              </a:solidFill>
+            </a:endParaRPr>
+          </a:p>
+        </p:txBody>
+      </p:sp>
+      <p:sp>
+        <p:nvSpPr>
+          <p:cNvPr id="156" name="テキスト ボックス 155"/>
+          <p:cNvSpPr txBox="1"/>
+          <p:nvPr/>
+        </p:nvSpPr>
+        <p:spPr>
+          <a:xfrm>
+            <a:off x="1060438" y="2245891"/>
+            <a:ext cx="1444651" cy="253916"/>
+          </a:xfrm>
+          <a:prstGeom prst="rect">
+            <a:avLst/>
+          </a:prstGeom>
+          <a:noFill/>
+        </p:spPr>
+        <p:txBody>
+          <a:bodyPr wrap="square" rtlCol="0">
+            <a:spAutoFit/>
+          </a:bodyPr>
+          <a:lstStyle/>
+          <a:p>
+            <a:r>
+              <a:rPr lang="en-US" altLang="ja-JP" sz="1050" dirty="0" smtClean="0">
+                <a:solidFill>
+                  <a:schemeClr val="tx1">
+                    <a:lumMod val="75000"/>
+                    <a:lumOff val="25000"/>
+                  </a:schemeClr>
+                </a:solidFill>
+              </a:rPr>
+              <a:t>register</a:t>
+            </a:r>
+            <a:endParaRPr lang="en-US" altLang="ja-JP" sz="1050" dirty="0" smtClean="0">
+              <a:solidFill>
+                <a:schemeClr val="tx1">
+                  <a:lumMod val="75000"/>
+                  <a:lumOff val="25000"/>
+                </a:schemeClr>
+              </a:solidFill>
+            </a:endParaRPr>
+          </a:p>
+        </p:txBody>
+      </p:sp>
+      <p:cxnSp>
+        <p:nvCxnSpPr>
+          <p:cNvPr id="157" name="カギ線コネクタ 156"/>
+          <p:cNvCxnSpPr>
+            <a:stCxn id="80" idx="3"/>
+            <a:endCxn id="82" idx="1"/>
+          </p:cNvCxnSpPr>
+          <p:nvPr/>
+        </p:nvCxnSpPr>
+        <p:spPr>
+          <a:xfrm>
+            <a:off x="2406362" y="3273990"/>
+            <a:ext cx="229100" cy="1404"/>
+          </a:xfrm>
+          <a:prstGeom prst="bentConnector3">
+            <a:avLst>
+              <a:gd name="adj1" fmla="val 50000"/>
+            </a:avLst>
+          </a:prstGeom>
+          <a:ln w="15875">
+            <a:solidFill>
+              <a:schemeClr val="tx1">
+                <a:lumMod val="75000"/>
+                <a:lumOff val="25000"/>
+              </a:schemeClr>
+            </a:solidFill>
+            <a:tailEnd type="arrow"/>
+          </a:ln>
+        </p:spPr>
+        <p:style>
+          <a:lnRef idx="1">
+            <a:schemeClr val="accent1"/>
+          </a:lnRef>
+          <a:fillRef idx="0">
+            <a:schemeClr val="accent1"/>
+          </a:fillRef>
+          <a:effectRef idx="0">
+            <a:schemeClr val="accent1"/>
+          </a:effectRef>
+          <a:fontRef idx="minor">
+            <a:schemeClr val="tx1"/>
+          </a:fontRef>
+        </p:style>
+      </p:cxnSp>
+      <p:sp>
+        <p:nvSpPr>
+          <p:cNvPr id="160" name="テキスト ボックス 159"/>
+          <p:cNvSpPr txBox="1"/>
+          <p:nvPr/>
+        </p:nvSpPr>
+        <p:spPr>
+          <a:xfrm>
+            <a:off x="2442090" y="4234917"/>
+            <a:ext cx="569621" cy="253916"/>
+          </a:xfrm>
+          <a:prstGeom prst="rect">
+            <a:avLst/>
+          </a:prstGeom>
+          <a:noFill/>
+        </p:spPr>
+        <p:txBody>
+          <a:bodyPr wrap="square" rtlCol="0">
+            <a:spAutoFit/>
+          </a:bodyPr>
+          <a:lstStyle/>
+          <a:p>
+            <a:r>
+              <a:rPr lang="en-US" altLang="ja-JP" sz="1050" dirty="0">
+                <a:solidFill>
+                  <a:schemeClr val="tx1">
+                    <a:lumMod val="75000"/>
+                    <a:lumOff val="25000"/>
+                  </a:schemeClr>
+                </a:solidFill>
+              </a:rPr>
+              <a:t>S</a:t>
+            </a:r>
+            <a:r>
+              <a:rPr lang="en-US" altLang="ja-JP" sz="1050" dirty="0" smtClean="0">
+                <a:solidFill>
+                  <a:schemeClr val="tx1">
+                    <a:lumMod val="75000"/>
+                    <a:lumOff val="25000"/>
+                  </a:schemeClr>
+                </a:solidFill>
+              </a:rPr>
+              <a:t>earch</a:t>
+            </a:r>
+            <a:endParaRPr lang="en-US" altLang="ja-JP" sz="1050" dirty="0" smtClean="0">
+              <a:solidFill>
+                <a:schemeClr val="tx1">
+                  <a:lumMod val="75000"/>
+                  <a:lumOff val="25000"/>
+                </a:schemeClr>
+              </a:solidFill>
+            </a:endParaRPr>
+          </a:p>
+        </p:txBody>
+      </p:sp>
+      <p:sp>
+        <p:nvSpPr>
+          <p:cNvPr id="161" name="テキスト ボックス 160"/>
+          <p:cNvSpPr txBox="1"/>
+          <p:nvPr/>
+        </p:nvSpPr>
+        <p:spPr>
+          <a:xfrm>
+            <a:off x="3053447" y="4234877"/>
+            <a:ext cx="569621" cy="253916"/>
+          </a:xfrm>
+          <a:prstGeom prst="rect">
+            <a:avLst/>
+          </a:prstGeom>
+          <a:noFill/>
+        </p:spPr>
+        <p:txBody>
+          <a:bodyPr wrap="square" rtlCol="0">
+            <a:spAutoFit/>
+          </a:bodyPr>
+          <a:lstStyle/>
+          <a:p>
+            <a:r>
+              <a:rPr lang="en-US" altLang="ja-JP" sz="1050" dirty="0" smtClean="0">
+                <a:solidFill>
+                  <a:schemeClr val="tx1">
+                    <a:lumMod val="75000"/>
+                    <a:lumOff val="25000"/>
+                  </a:schemeClr>
+                </a:solidFill>
+              </a:rPr>
+              <a:t>result</a:t>
+            </a:r>
+            <a:endParaRPr lang="en-US" altLang="ja-JP" sz="1050" dirty="0" smtClean="0">
+              <a:solidFill>
+                <a:schemeClr val="tx1">
+                  <a:lumMod val="75000"/>
+                  <a:lumOff val="25000"/>
+                </a:schemeClr>
+              </a:solidFill>
+            </a:endParaRPr>
+          </a:p>
+        </p:txBody>
+      </p:sp>
+      <p:sp>
+        <p:nvSpPr>
+          <p:cNvPr id="162" name="円柱 161"/>
+          <p:cNvSpPr/>
+          <p:nvPr/>
+        </p:nvSpPr>
+        <p:spPr>
+          <a:xfrm>
+            <a:off x="1610916" y="4080681"/>
+            <a:ext cx="612068" cy="504511"/>
+          </a:xfrm>
+          <a:prstGeom prst="can">
+            <a:avLst/>
+          </a:prstGeom>
+          <a:solidFill>
+            <a:schemeClr val="bg2"/>
+          </a:solidFill>
+          <a:ln>
+            <a:solidFill>
+              <a:schemeClr val="tx1">
+                <a:lumMod val="75000"/>
+                <a:lumOff val="25000"/>
+              </a:schemeClr>
+            </a:solidFill>
+          </a:ln>
+        </p:spPr>
+        <p:style>
+          <a:lnRef idx="2">
+            <a:schemeClr val="accent1">
+              <a:shade val="50000"/>
+            </a:schemeClr>
+          </a:lnRef>
+          <a:fillRef idx="1">
+            <a:schemeClr val="accent1"/>
+          </a:fillRef>
+          <a:effectRef idx="0">
+            <a:schemeClr val="accent1"/>
+          </a:effectRef>
+          <a:fontRef idx="minor">
+            <a:schemeClr val="lt1"/>
+          </a:fontRef>
+        </p:style>
+        <p:txBody>
+          <a:bodyPr rtlCol="0" anchor="ctr"/>
+          <a:lstStyle/>
+          <a:p>
+            <a:pPr algn="ctr"/>
+            <a:r>
+              <a:rPr kumimoji="1" lang="en-US" altLang="ja-JP" sz="1200" dirty="0" smtClean="0">
+                <a:solidFill>
+                  <a:schemeClr val="tx1">
+                    <a:lumMod val="75000"/>
+                    <a:lumOff val="25000"/>
+                  </a:schemeClr>
+                </a:solidFill>
+              </a:rPr>
+              <a:t>Query</a:t>
+            </a:r>
+          </a:p>
+          <a:p>
+            <a:pPr algn="ctr"/>
+            <a:r>
+              <a:rPr lang="en-US" altLang="ja-JP" sz="1200" dirty="0" smtClean="0">
+                <a:solidFill>
+                  <a:schemeClr val="tx1">
+                    <a:lumMod val="75000"/>
+                    <a:lumOff val="25000"/>
+                  </a:schemeClr>
+                </a:solidFill>
+              </a:rPr>
+              <a:t>List</a:t>
+            </a:r>
+            <a:endParaRPr kumimoji="1" lang="ja-JP" altLang="en-US" sz="1200" dirty="0">
+              <a:solidFill>
+                <a:schemeClr val="tx1">
+                  <a:lumMod val="75000"/>
+                  <a:lumOff val="25000"/>
+                </a:schemeClr>
+              </a:solidFill>
+            </a:endParaRPr>
+          </a:p>
+        </p:txBody>
+      </p:sp>
+      <p:cxnSp>
+        <p:nvCxnSpPr>
+          <p:cNvPr id="163" name="カギ線コネクタ 162"/>
+          <p:cNvCxnSpPr>
+            <a:stCxn id="162" idx="1"/>
+          </p:cNvCxnSpPr>
+          <p:nvPr/>
+        </p:nvCxnSpPr>
+        <p:spPr>
+          <a:xfrm rot="5400000" flipH="1" flipV="1">
+            <a:off x="1750147" y="3708440"/>
+            <a:ext cx="539045" cy="205439"/>
+          </a:xfrm>
+          <a:prstGeom prst="bentConnector3">
+            <a:avLst>
+              <a:gd name="adj1" fmla="val 50000"/>
+            </a:avLst>
+          </a:prstGeom>
+          <a:ln w="12700">
+            <a:solidFill>
+              <a:schemeClr val="tx1">
+                <a:lumMod val="75000"/>
+                <a:lumOff val="25000"/>
+              </a:schemeClr>
+            </a:solidFill>
+            <a:headEnd type="arrow"/>
+            <a:tailEnd type="arrow"/>
+          </a:ln>
+        </p:spPr>
+        <p:style>
+          <a:lnRef idx="1">
+            <a:schemeClr val="accent1"/>
+          </a:lnRef>
+          <a:fillRef idx="0">
+            <a:schemeClr val="accent1"/>
+          </a:fillRef>
+          <a:effectRef idx="0">
+            <a:schemeClr val="accent1"/>
+          </a:effectRef>
+          <a:fontRef idx="minor">
+            <a:schemeClr val="tx1"/>
+          </a:fontRef>
+        </p:style>
+      </p:cxnSp>
+      <p:sp>
+        <p:nvSpPr>
+          <p:cNvPr id="164" name="テキスト ボックス 163"/>
+          <p:cNvSpPr txBox="1"/>
+          <p:nvPr/>
+        </p:nvSpPr>
+        <p:spPr>
+          <a:xfrm>
+            <a:off x="2222984" y="1588070"/>
+            <a:ext cx="897037" cy="738664"/>
+          </a:xfrm>
+          <a:prstGeom prst="rect">
+            <a:avLst/>
+          </a:prstGeom>
+          <a:noFill/>
+        </p:spPr>
+        <p:txBody>
+          <a:bodyPr wrap="square" rtlCol="0">
+            <a:spAutoFit/>
+          </a:bodyPr>
+          <a:lstStyle/>
+          <a:p>
+            <a:r>
+              <a:rPr lang="ja-JP" altLang="en-US" sz="1050" dirty="0" smtClean="0">
+                <a:solidFill>
+                  <a:schemeClr val="tx1">
+                    <a:lumMod val="75000"/>
+                    <a:lumOff val="25000"/>
+                  </a:schemeClr>
+                </a:solidFill>
+              </a:rPr>
+              <a:t>・</a:t>
+            </a:r>
+            <a:r>
+              <a:rPr lang="en-US" altLang="ja-JP" sz="1050" dirty="0" smtClean="0">
+                <a:solidFill>
+                  <a:schemeClr val="tx1">
+                    <a:lumMod val="75000"/>
+                    <a:lumOff val="25000"/>
+                  </a:schemeClr>
+                </a:solidFill>
+              </a:rPr>
+              <a:t>query a</a:t>
+            </a:r>
+          </a:p>
+          <a:p>
+            <a:r>
+              <a:rPr lang="ja-JP" altLang="en-US" sz="1050" dirty="0" smtClean="0">
+                <a:solidFill>
+                  <a:schemeClr val="tx1">
+                    <a:lumMod val="75000"/>
+                    <a:lumOff val="25000"/>
+                  </a:schemeClr>
+                </a:solidFill>
+              </a:rPr>
+              <a:t>・</a:t>
+            </a:r>
+            <a:r>
+              <a:rPr lang="en-US" altLang="ja-JP" sz="1050" dirty="0" smtClean="0">
+                <a:solidFill>
+                  <a:schemeClr val="tx1">
+                    <a:lumMod val="75000"/>
+                    <a:lumOff val="25000"/>
+                  </a:schemeClr>
+                </a:solidFill>
+              </a:rPr>
+              <a:t>query b</a:t>
+            </a:r>
+          </a:p>
+          <a:p>
+            <a:r>
+              <a:rPr lang="ja-JP" altLang="en-US" sz="1050" dirty="0">
+                <a:solidFill>
+                  <a:schemeClr val="tx1">
+                    <a:lumMod val="75000"/>
+                    <a:lumOff val="25000"/>
+                  </a:schemeClr>
+                </a:solidFill>
+              </a:rPr>
+              <a:t>・</a:t>
+            </a:r>
+            <a:r>
+              <a:rPr lang="en-US" altLang="ja-JP" sz="1050" dirty="0">
+                <a:solidFill>
+                  <a:schemeClr val="tx1">
+                    <a:lumMod val="75000"/>
+                    <a:lumOff val="25000"/>
+                  </a:schemeClr>
+                </a:solidFill>
+              </a:rPr>
+              <a:t>query </a:t>
+            </a:r>
+            <a:r>
+              <a:rPr lang="en-US" altLang="ja-JP" sz="1050" dirty="0" smtClean="0">
+                <a:solidFill>
+                  <a:schemeClr val="tx1">
+                    <a:lumMod val="75000"/>
+                    <a:lumOff val="25000"/>
+                  </a:schemeClr>
+                </a:solidFill>
+              </a:rPr>
+              <a:t>c</a:t>
+            </a:r>
+            <a:endParaRPr lang="en-US" altLang="ja-JP" sz="1050" dirty="0">
+              <a:solidFill>
+                <a:schemeClr val="tx1">
+                  <a:lumMod val="75000"/>
+                  <a:lumOff val="25000"/>
+                </a:schemeClr>
+              </a:solidFill>
+            </a:endParaRPr>
+          </a:p>
+          <a:p>
+            <a:r>
+              <a:rPr lang="ja-JP" altLang="en-US" sz="1050" dirty="0">
+                <a:solidFill>
+                  <a:schemeClr val="tx1">
+                    <a:lumMod val="75000"/>
+                    <a:lumOff val="25000"/>
+                  </a:schemeClr>
+                </a:solidFill>
+              </a:rPr>
+              <a:t>・ </a:t>
+            </a:r>
+            <a:r>
+              <a:rPr lang="en-US" altLang="ja-JP" sz="1050" dirty="0" smtClean="0">
+                <a:solidFill>
+                  <a:schemeClr val="tx1">
+                    <a:lumMod val="75000"/>
+                    <a:lumOff val="25000"/>
+                  </a:schemeClr>
+                </a:solidFill>
+              </a:rPr>
+              <a:t>…</a:t>
+            </a:r>
+            <a:endParaRPr lang="en-US" altLang="ja-JP" sz="1050" dirty="0" smtClean="0">
+              <a:solidFill>
+                <a:schemeClr val="tx1">
+                  <a:lumMod val="75000"/>
+                  <a:lumOff val="25000"/>
+                </a:schemeClr>
+              </a:solidFill>
+            </a:endParaRPr>
+          </a:p>
+        </p:txBody>
+      </p:sp>
+      <p:sp>
+        <p:nvSpPr>
+          <p:cNvPr id="165" name="円柱 164"/>
+          <p:cNvSpPr/>
+          <p:nvPr/>
+        </p:nvSpPr>
+        <p:spPr>
+          <a:xfrm>
+            <a:off x="3649484" y="4110936"/>
+            <a:ext cx="881504" cy="504511"/>
+          </a:xfrm>
+          <a:prstGeom prst="can">
+            <a:avLst/>
+          </a:prstGeom>
+          <a:solidFill>
+            <a:schemeClr val="bg2"/>
+          </a:solidFill>
+          <a:ln>
+            <a:solidFill>
+              <a:schemeClr val="tx1">
+                <a:lumMod val="75000"/>
+                <a:lumOff val="25000"/>
+              </a:schemeClr>
+            </a:solidFill>
+          </a:ln>
+        </p:spPr>
+        <p:style>
+          <a:lnRef idx="2">
+            <a:schemeClr val="accent1">
+              <a:shade val="50000"/>
+            </a:schemeClr>
+          </a:lnRef>
+          <a:fillRef idx="1">
+            <a:schemeClr val="accent1"/>
+          </a:fillRef>
+          <a:effectRef idx="0">
+            <a:schemeClr val="accent1"/>
+          </a:effectRef>
+          <a:fontRef idx="minor">
+            <a:schemeClr val="lt1"/>
+          </a:fontRef>
+        </p:style>
+        <p:txBody>
+          <a:bodyPr rtlCol="0" anchor="ctr"/>
+          <a:lstStyle/>
+          <a:p>
+            <a:pPr algn="ctr"/>
+            <a:r>
+              <a:rPr kumimoji="1" lang="en-US" altLang="ja-JP" sz="1200" dirty="0" smtClean="0">
+                <a:solidFill>
+                  <a:schemeClr val="tx1">
+                    <a:lumMod val="75000"/>
+                    <a:lumOff val="25000"/>
+                  </a:schemeClr>
+                </a:solidFill>
+              </a:rPr>
+              <a:t>Annotation</a:t>
+            </a:r>
+          </a:p>
+          <a:p>
+            <a:pPr algn="ctr"/>
+            <a:r>
+              <a:rPr lang="en-US" altLang="ja-JP" sz="1200" dirty="0" smtClean="0">
+                <a:solidFill>
+                  <a:schemeClr val="tx1">
+                    <a:lumMod val="75000"/>
+                    <a:lumOff val="25000"/>
+                  </a:schemeClr>
+                </a:solidFill>
+              </a:rPr>
+              <a:t>Data</a:t>
+            </a:r>
+            <a:endParaRPr kumimoji="1" lang="ja-JP" altLang="en-US" sz="1200" dirty="0">
+              <a:solidFill>
+                <a:schemeClr val="tx1">
+                  <a:lumMod val="75000"/>
+                  <a:lumOff val="25000"/>
+                </a:schemeClr>
+              </a:solidFill>
+            </a:endParaRPr>
+          </a:p>
+        </p:txBody>
+      </p:sp>
+      <p:cxnSp>
+        <p:nvCxnSpPr>
+          <p:cNvPr id="167" name="カギ線コネクタ 166"/>
+          <p:cNvCxnSpPr>
+            <a:stCxn id="165" idx="1"/>
+            <a:endCxn id="82" idx="2"/>
+          </p:cNvCxnSpPr>
+          <p:nvPr/>
+        </p:nvCxnSpPr>
+        <p:spPr>
+          <a:xfrm rot="16200000" flipV="1">
+            <a:off x="3393109" y="3413809"/>
+            <a:ext cx="569302" cy="824952"/>
+          </a:xfrm>
+          <a:prstGeom prst="bentConnector3">
+            <a:avLst>
+              <a:gd name="adj1" fmla="val 50000"/>
+            </a:avLst>
+          </a:prstGeom>
+          <a:ln w="12700">
+            <a:solidFill>
+              <a:schemeClr val="tx1">
+                <a:lumMod val="75000"/>
+                <a:lumOff val="25000"/>
+              </a:schemeClr>
+            </a:solidFill>
+            <a:headEnd type="arrow"/>
+            <a:tailEnd type="none"/>
+          </a:ln>
+        </p:spPr>
+        <p:style>
+          <a:lnRef idx="1">
+            <a:schemeClr val="accent1"/>
+          </a:lnRef>
+          <a:fillRef idx="0">
+            <a:schemeClr val="accent1"/>
+          </a:fillRef>
+          <a:effectRef idx="0">
+            <a:schemeClr val="accent1"/>
+          </a:effectRef>
+          <a:fontRef idx="minor">
+            <a:schemeClr val="tx1"/>
+          </a:fontRef>
+        </p:style>
+      </p:cxnSp>
+      <p:cxnSp>
+        <p:nvCxnSpPr>
+          <p:cNvPr id="168" name="カギ線コネクタ 167"/>
+          <p:cNvCxnSpPr>
+            <a:stCxn id="82" idx="3"/>
+            <a:endCxn id="83" idx="1"/>
+          </p:cNvCxnSpPr>
+          <p:nvPr/>
+        </p:nvCxnSpPr>
+        <p:spPr>
+          <a:xfrm flipV="1">
+            <a:off x="3895106" y="3273990"/>
+            <a:ext cx="625605" cy="1404"/>
+          </a:xfrm>
+          <a:prstGeom prst="bentConnector3">
+            <a:avLst>
+              <a:gd name="adj1" fmla="val 50000"/>
+            </a:avLst>
+          </a:prstGeom>
+          <a:ln w="15875">
+            <a:solidFill>
+              <a:schemeClr val="tx1">
+                <a:lumMod val="75000"/>
+                <a:lumOff val="25000"/>
+              </a:schemeClr>
+            </a:solidFill>
+            <a:tailEnd type="arrow"/>
+          </a:ln>
+        </p:spPr>
+        <p:style>
+          <a:lnRef idx="1">
+            <a:schemeClr val="accent1"/>
+          </a:lnRef>
+          <a:fillRef idx="0">
+            <a:schemeClr val="accent1"/>
+          </a:fillRef>
+          <a:effectRef idx="0">
+            <a:schemeClr val="accent1"/>
+          </a:effectRef>
+          <a:fontRef idx="minor">
+            <a:schemeClr val="tx1"/>
+          </a:fontRef>
+        </p:style>
+      </p:cxnSp>
+      <p:sp>
+        <p:nvSpPr>
+          <p:cNvPr id="169" name="テキスト ボックス 168"/>
+          <p:cNvSpPr txBox="1"/>
+          <p:nvPr/>
+        </p:nvSpPr>
+        <p:spPr>
+          <a:xfrm>
+            <a:off x="3771209" y="2570455"/>
+            <a:ext cx="1152128" cy="338554"/>
+          </a:xfrm>
+          <a:prstGeom prst="rect">
+            <a:avLst/>
+          </a:prstGeom>
+          <a:noFill/>
+        </p:spPr>
+        <p:txBody>
+          <a:bodyPr wrap="square" rtlCol="0">
+            <a:spAutoFit/>
+          </a:bodyPr>
+          <a:lstStyle/>
+          <a:p>
+            <a:r>
+              <a:rPr lang="en-US" altLang="ja-JP" sz="1600" b="1" dirty="0" smtClean="0">
+                <a:solidFill>
+                  <a:schemeClr val="tx1">
+                    <a:lumMod val="75000"/>
+                    <a:lumOff val="25000"/>
+                  </a:schemeClr>
+                </a:solidFill>
+              </a:rPr>
+              <a:t>NLP4L-LTR </a:t>
+            </a:r>
+            <a:endParaRPr lang="en-US" altLang="ja-JP" sz="1600" b="1" dirty="0" smtClean="0">
+              <a:solidFill>
+                <a:schemeClr val="tx1">
+                  <a:lumMod val="75000"/>
+                  <a:lumOff val="25000"/>
+                </a:schemeClr>
+              </a:solidFill>
+            </a:endParaRPr>
+          </a:p>
+        </p:txBody>
+      </p:sp>
+      <p:sp>
+        <p:nvSpPr>
+          <p:cNvPr id="170" name="テキスト ボックス 169"/>
+          <p:cNvSpPr txBox="1"/>
+          <p:nvPr/>
+        </p:nvSpPr>
+        <p:spPr>
+          <a:xfrm>
+            <a:off x="3322560" y="3589160"/>
+            <a:ext cx="2302919" cy="415498"/>
+          </a:xfrm>
+          <a:prstGeom prst="rect">
+            <a:avLst/>
+          </a:prstGeom>
+          <a:noFill/>
+        </p:spPr>
+        <p:txBody>
+          <a:bodyPr wrap="square" rtlCol="0">
+            <a:spAutoFit/>
+          </a:bodyPr>
+          <a:lstStyle/>
+          <a:p>
+            <a:r>
+              <a:rPr lang="en-US" altLang="ja-JP" sz="1050" dirty="0" smtClean="0">
+                <a:solidFill>
+                  <a:schemeClr val="tx1">
+                    <a:lumMod val="75000"/>
+                    <a:lumOff val="25000"/>
+                  </a:schemeClr>
+                </a:solidFill>
+              </a:rPr>
+              <a:t>Evaluate result </a:t>
+            </a:r>
+          </a:p>
+          <a:p>
+            <a:r>
+              <a:rPr lang="en-US" altLang="ja-JP" sz="1050" dirty="0" smtClean="0">
+                <a:solidFill>
+                  <a:schemeClr val="tx1">
+                    <a:lumMod val="75000"/>
+                    <a:lumOff val="25000"/>
+                  </a:schemeClr>
+                </a:solidFill>
+              </a:rPr>
+              <a:t>and  save annotation</a:t>
+            </a:r>
+            <a:endParaRPr lang="en-US" altLang="ja-JP" sz="1050" dirty="0" smtClean="0">
+              <a:solidFill>
+                <a:schemeClr val="tx1">
+                  <a:lumMod val="75000"/>
+                  <a:lumOff val="25000"/>
+                </a:schemeClr>
+              </a:solidFill>
+            </a:endParaRPr>
+          </a:p>
+        </p:txBody>
+      </p:sp>
+      <p:sp>
+        <p:nvSpPr>
+          <p:cNvPr id="171" name="角丸四角形 170"/>
+          <p:cNvSpPr/>
+          <p:nvPr/>
+        </p:nvSpPr>
+        <p:spPr>
+          <a:xfrm>
+            <a:off x="4053534" y="4957232"/>
+            <a:ext cx="1571945" cy="407785"/>
+          </a:xfrm>
+          <a:prstGeom prst="roundRect">
+            <a:avLst/>
+          </a:prstGeom>
+          <a:solidFill>
+            <a:schemeClr val="accent3">
+              <a:lumMod val="20000"/>
+              <a:lumOff val="80000"/>
+            </a:schemeClr>
+          </a:solidFill>
+          <a:ln w="9525">
+            <a:solidFill>
+              <a:schemeClr val="tx1">
+                <a:lumMod val="75000"/>
+                <a:lumOff val="25000"/>
+              </a:schemeClr>
+            </a:solidFill>
+          </a:ln>
+        </p:spPr>
+        <p:style>
+          <a:lnRef idx="2">
+            <a:schemeClr val="accent1">
+              <a:shade val="50000"/>
+            </a:schemeClr>
+          </a:lnRef>
+          <a:fillRef idx="1">
+            <a:schemeClr val="accent1"/>
+          </a:fillRef>
+          <a:effectRef idx="0">
+            <a:schemeClr val="accent1"/>
+          </a:effectRef>
+          <a:fontRef idx="minor">
+            <a:schemeClr val="lt1"/>
+          </a:fontRef>
+        </p:style>
+        <p:txBody>
+          <a:bodyPr rot="0" spcFirstLastPara="0" vertOverflow="overflow" horzOverflow="overflow" vert="horz" wrap="square" lIns="91440" tIns="45720" rIns="91440" bIns="45720" numCol="1" spcCol="0" rtlCol="0" fromWordArt="0" anchor="ctr" anchorCtr="0" forceAA="0" compatLnSpc="1">
+            <a:prstTxWarp prst="textNoShape">
+              <a:avLst/>
+            </a:prstTxWarp>
+            <a:noAutofit/>
+          </a:bodyPr>
+          <a:lstStyle/>
+          <a:p>
+            <a:pPr algn="ctr"/>
+            <a:r>
+              <a:rPr kumimoji="1" lang="en-US" altLang="ja-JP" sz="1400" dirty="0" smtClean="0">
+                <a:solidFill>
+                  <a:schemeClr val="tx1">
+                    <a:lumMod val="75000"/>
+                    <a:lumOff val="25000"/>
+                  </a:schemeClr>
+                </a:solidFill>
+              </a:rPr>
+              <a:t>LTR Feature extraction module</a:t>
+            </a:r>
+            <a:endParaRPr kumimoji="1" lang="en-US" altLang="ja-JP" sz="1400" dirty="0" smtClean="0">
+              <a:solidFill>
+                <a:schemeClr val="tx1">
+                  <a:lumMod val="75000"/>
+                  <a:lumOff val="25000"/>
+                </a:schemeClr>
+              </a:solidFill>
+            </a:endParaRPr>
+          </a:p>
+        </p:txBody>
+      </p:sp>
+      <p:sp>
+        <p:nvSpPr>
+          <p:cNvPr id="172" name="角丸四角形 171"/>
+          <p:cNvSpPr/>
+          <p:nvPr/>
+        </p:nvSpPr>
+        <p:spPr>
+          <a:xfrm>
+            <a:off x="5932409" y="5294026"/>
+            <a:ext cx="1571945" cy="407785"/>
+          </a:xfrm>
+          <a:prstGeom prst="roundRect">
+            <a:avLst/>
+          </a:prstGeom>
+          <a:solidFill>
+            <a:schemeClr val="accent3">
+              <a:lumMod val="20000"/>
+              <a:lumOff val="80000"/>
+            </a:schemeClr>
+          </a:solidFill>
+          <a:ln w="9525">
+            <a:solidFill>
+              <a:schemeClr val="tx1">
+                <a:lumMod val="75000"/>
+                <a:lumOff val="25000"/>
+              </a:schemeClr>
+            </a:solidFill>
+          </a:ln>
+        </p:spPr>
+        <p:style>
+          <a:lnRef idx="2">
+            <a:schemeClr val="accent1">
+              <a:shade val="50000"/>
+            </a:schemeClr>
+          </a:lnRef>
+          <a:fillRef idx="1">
+            <a:schemeClr val="accent1"/>
+          </a:fillRef>
+          <a:effectRef idx="0">
+            <a:schemeClr val="accent1"/>
+          </a:effectRef>
+          <a:fontRef idx="minor">
+            <a:schemeClr val="lt1"/>
+          </a:fontRef>
+        </p:style>
+        <p:txBody>
+          <a:bodyPr rot="0" spcFirstLastPara="0" vertOverflow="overflow" horzOverflow="overflow" vert="horz" wrap="square" lIns="91440" tIns="45720" rIns="91440" bIns="45720" numCol="1" spcCol="0" rtlCol="0" fromWordArt="0" anchor="ctr" anchorCtr="0" forceAA="0" compatLnSpc="1">
+            <a:prstTxWarp prst="textNoShape">
+              <a:avLst/>
+            </a:prstTxWarp>
+            <a:noAutofit/>
+          </a:bodyPr>
+          <a:lstStyle/>
+          <a:p>
+            <a:pPr algn="ctr"/>
+            <a:r>
+              <a:rPr kumimoji="1" lang="en-US" altLang="ja-JP" sz="1400" dirty="0" smtClean="0">
+                <a:solidFill>
+                  <a:schemeClr val="tx1">
+                    <a:lumMod val="75000"/>
+                    <a:lumOff val="25000"/>
+                  </a:schemeClr>
+                </a:solidFill>
+              </a:rPr>
+              <a:t>LTR </a:t>
+            </a:r>
+            <a:r>
+              <a:rPr kumimoji="1" lang="en-US" altLang="ja-JP" sz="1400" dirty="0" err="1" smtClean="0">
+                <a:solidFill>
+                  <a:schemeClr val="tx1">
+                    <a:lumMod val="75000"/>
+                    <a:lumOff val="25000"/>
+                  </a:schemeClr>
+                </a:solidFill>
+              </a:rPr>
+              <a:t>ReRank</a:t>
+            </a:r>
+            <a:r>
+              <a:rPr kumimoji="1" lang="en-US" altLang="ja-JP" sz="1400" dirty="0" smtClean="0">
+                <a:solidFill>
+                  <a:schemeClr val="tx1">
+                    <a:lumMod val="75000"/>
+                    <a:lumOff val="25000"/>
+                  </a:schemeClr>
+                </a:solidFill>
+              </a:rPr>
+              <a:t> module</a:t>
+            </a:r>
+            <a:endParaRPr kumimoji="1" lang="en-US" altLang="ja-JP" sz="1400" dirty="0" smtClean="0">
+              <a:solidFill>
+                <a:schemeClr val="tx1">
+                  <a:lumMod val="75000"/>
+                  <a:lumOff val="25000"/>
+                </a:schemeClr>
+              </a:solidFill>
+            </a:endParaRPr>
+          </a:p>
+        </p:txBody>
+      </p:sp>
+      <p:grpSp>
+        <p:nvGrpSpPr>
+          <p:cNvPr id="239" name="グループ化 238"/>
+          <p:cNvGrpSpPr/>
+          <p:nvPr/>
+        </p:nvGrpSpPr>
+        <p:grpSpPr>
+          <a:xfrm>
+            <a:off x="2928483" y="3521339"/>
+            <a:ext cx="191538" cy="1511985"/>
+            <a:chOff x="2928483" y="3526950"/>
+            <a:chExt cx="191538" cy="1426864"/>
+          </a:xfrm>
+        </p:grpSpPr>
+        <p:cxnSp>
+          <p:nvCxnSpPr>
+            <p:cNvPr id="158" name="カギ線コネクタ 157"/>
+            <p:cNvCxnSpPr/>
+            <p:nvPr/>
+          </p:nvCxnSpPr>
+          <p:spPr>
+            <a:xfrm rot="5400000">
+              <a:off x="2224356" y="4245761"/>
+              <a:ext cx="1408256" cy="2"/>
+            </a:xfrm>
+            <a:prstGeom prst="bentConnector3">
+              <a:avLst>
+                <a:gd name="adj1" fmla="val 50000"/>
+              </a:avLst>
+            </a:prstGeom>
+            <a:ln w="15875">
+              <a:solidFill>
+                <a:schemeClr val="tx1">
+                  <a:lumMod val="75000"/>
+                  <a:lumOff val="25000"/>
+                </a:schemeClr>
+              </a:solidFill>
+              <a:tailEnd type="none"/>
+            </a:ln>
+          </p:spPr>
+          <p:style>
+            <a:lnRef idx="1">
+              <a:schemeClr val="accent1"/>
+            </a:lnRef>
+            <a:fillRef idx="0">
+              <a:schemeClr val="accent1"/>
+            </a:fillRef>
+            <a:effectRef idx="0">
+              <a:schemeClr val="accent1"/>
+            </a:effectRef>
+            <a:fontRef idx="minor">
+              <a:schemeClr val="tx1"/>
+            </a:fontRef>
+          </p:style>
+        </p:cxnSp>
+        <p:cxnSp>
+          <p:nvCxnSpPr>
+            <p:cNvPr id="159" name="カギ線コネクタ 158"/>
+            <p:cNvCxnSpPr/>
+            <p:nvPr/>
+          </p:nvCxnSpPr>
+          <p:spPr>
+            <a:xfrm rot="5400000">
+              <a:off x="2406046" y="4238419"/>
+              <a:ext cx="1422940" cy="2"/>
+            </a:xfrm>
+            <a:prstGeom prst="bentConnector3">
+              <a:avLst>
+                <a:gd name="adj1" fmla="val 50000"/>
+              </a:avLst>
+            </a:prstGeom>
+            <a:ln w="15875">
+              <a:solidFill>
+                <a:schemeClr val="tx1">
+                  <a:lumMod val="75000"/>
+                  <a:lumOff val="25000"/>
+                </a:schemeClr>
+              </a:solidFill>
+              <a:headEnd type="arrow"/>
+              <a:tailEnd type="none"/>
+            </a:ln>
+          </p:spPr>
+          <p:style>
+            <a:lnRef idx="1">
+              <a:schemeClr val="accent1"/>
+            </a:lnRef>
+            <a:fillRef idx="0">
+              <a:schemeClr val="accent1"/>
+            </a:fillRef>
+            <a:effectRef idx="0">
+              <a:schemeClr val="accent1"/>
+            </a:effectRef>
+            <a:fontRef idx="minor">
+              <a:schemeClr val="tx1"/>
+            </a:fontRef>
+          </p:style>
+        </p:cxnSp>
+        <p:cxnSp>
+          <p:nvCxnSpPr>
+            <p:cNvPr id="93" name="直線コネクタ 92"/>
+            <p:cNvCxnSpPr/>
+            <p:nvPr/>
+          </p:nvCxnSpPr>
+          <p:spPr>
+            <a:xfrm>
+              <a:off x="2928483" y="4953814"/>
+              <a:ext cx="191538" cy="0"/>
+            </a:xfrm>
+            <a:prstGeom prst="line">
+              <a:avLst/>
+            </a:prstGeom>
+            <a:ln w="15875">
+              <a:solidFill>
+                <a:schemeClr val="tx1">
+                  <a:lumMod val="75000"/>
+                  <a:lumOff val="25000"/>
+                </a:schemeClr>
+              </a:solidFill>
+            </a:ln>
+          </p:spPr>
+          <p:style>
+            <a:lnRef idx="1">
+              <a:schemeClr val="accent1"/>
+            </a:lnRef>
+            <a:fillRef idx="0">
+              <a:schemeClr val="accent1"/>
+            </a:fillRef>
+            <a:effectRef idx="0">
+              <a:schemeClr val="accent1"/>
+            </a:effectRef>
+            <a:fontRef idx="minor">
+              <a:schemeClr val="tx1"/>
+            </a:fontRef>
+          </p:style>
+        </p:cxnSp>
+      </p:grpSp>
+      <p:cxnSp>
+        <p:nvCxnSpPr>
+          <p:cNvPr id="190" name="カギ線コネクタ 189"/>
+          <p:cNvCxnSpPr>
+            <a:stCxn id="83" idx="3"/>
+            <a:endCxn id="84" idx="1"/>
+          </p:cNvCxnSpPr>
+          <p:nvPr/>
+        </p:nvCxnSpPr>
+        <p:spPr>
+          <a:xfrm flipV="1">
+            <a:off x="5777299" y="3272902"/>
+            <a:ext cx="394344" cy="1088"/>
+          </a:xfrm>
+          <a:prstGeom prst="bentConnector3">
+            <a:avLst>
+              <a:gd name="adj1" fmla="val 50000"/>
+            </a:avLst>
+          </a:prstGeom>
+          <a:ln w="15875">
+            <a:solidFill>
+              <a:schemeClr val="tx1">
+                <a:lumMod val="75000"/>
+                <a:lumOff val="25000"/>
+              </a:schemeClr>
+            </a:solidFill>
+            <a:tailEnd type="arrow"/>
+          </a:ln>
+        </p:spPr>
+        <p:style>
+          <a:lnRef idx="1">
+            <a:schemeClr val="accent1"/>
+          </a:lnRef>
+          <a:fillRef idx="0">
+            <a:schemeClr val="accent1"/>
+          </a:fillRef>
+          <a:effectRef idx="0">
+            <a:schemeClr val="accent1"/>
+          </a:effectRef>
+          <a:fontRef idx="minor">
+            <a:schemeClr val="tx1"/>
+          </a:fontRef>
+        </p:style>
+      </p:cxnSp>
+      <p:cxnSp>
+        <p:nvCxnSpPr>
+          <p:cNvPr id="201" name="カギ線コネクタ 200"/>
+          <p:cNvCxnSpPr/>
+          <p:nvPr/>
+        </p:nvCxnSpPr>
+        <p:spPr>
+          <a:xfrm rot="5400000">
+            <a:off x="4030178" y="4253103"/>
+            <a:ext cx="1408256" cy="2"/>
+          </a:xfrm>
+          <a:prstGeom prst="bentConnector3">
+            <a:avLst>
+              <a:gd name="adj1" fmla="val 50000"/>
+            </a:avLst>
+          </a:prstGeom>
+          <a:ln w="15875">
+            <a:solidFill>
+              <a:schemeClr val="tx1">
+                <a:lumMod val="75000"/>
+                <a:lumOff val="25000"/>
+              </a:schemeClr>
+            </a:solidFill>
+            <a:tailEnd type="none"/>
+          </a:ln>
+        </p:spPr>
+        <p:style>
+          <a:lnRef idx="1">
+            <a:schemeClr val="accent1"/>
+          </a:lnRef>
+          <a:fillRef idx="0">
+            <a:schemeClr val="accent1"/>
+          </a:fillRef>
+          <a:effectRef idx="0">
+            <a:schemeClr val="accent1"/>
+          </a:effectRef>
+          <a:fontRef idx="minor">
+            <a:schemeClr val="tx1"/>
+          </a:fontRef>
+        </p:style>
+      </p:cxnSp>
+      <p:cxnSp>
+        <p:nvCxnSpPr>
+          <p:cNvPr id="202" name="カギ線コネクタ 201"/>
+          <p:cNvCxnSpPr/>
+          <p:nvPr/>
+        </p:nvCxnSpPr>
+        <p:spPr>
+          <a:xfrm rot="5400000">
+            <a:off x="4211868" y="4245761"/>
+            <a:ext cx="1422940" cy="2"/>
+          </a:xfrm>
+          <a:prstGeom prst="bentConnector3">
+            <a:avLst>
+              <a:gd name="adj1" fmla="val 50000"/>
+            </a:avLst>
+          </a:prstGeom>
+          <a:ln w="15875">
+            <a:solidFill>
+              <a:schemeClr val="tx1">
+                <a:lumMod val="75000"/>
+                <a:lumOff val="25000"/>
+              </a:schemeClr>
+            </a:solidFill>
+            <a:headEnd type="arrow"/>
+            <a:tailEnd type="none"/>
+          </a:ln>
+        </p:spPr>
+        <p:style>
+          <a:lnRef idx="1">
+            <a:schemeClr val="accent1"/>
+          </a:lnRef>
+          <a:fillRef idx="0">
+            <a:schemeClr val="accent1"/>
+          </a:fillRef>
+          <a:effectRef idx="0">
+            <a:schemeClr val="accent1"/>
+          </a:effectRef>
+          <a:fontRef idx="minor">
+            <a:schemeClr val="tx1"/>
+          </a:fontRef>
+        </p:style>
+      </p:cxnSp>
+      <p:cxnSp>
+        <p:nvCxnSpPr>
+          <p:cNvPr id="203" name="直線コネクタ 202"/>
+          <p:cNvCxnSpPr/>
+          <p:nvPr/>
+        </p:nvCxnSpPr>
+        <p:spPr>
+          <a:xfrm>
+            <a:off x="4734305" y="4957232"/>
+            <a:ext cx="191538" cy="0"/>
+          </a:xfrm>
+          <a:prstGeom prst="line">
+            <a:avLst/>
+          </a:prstGeom>
+          <a:ln w="15875">
+            <a:solidFill>
+              <a:schemeClr val="tx1">
+                <a:lumMod val="75000"/>
+                <a:lumOff val="25000"/>
+              </a:schemeClr>
+            </a:solidFill>
+          </a:ln>
+        </p:spPr>
+        <p:style>
+          <a:lnRef idx="1">
+            <a:schemeClr val="accent1"/>
+          </a:lnRef>
+          <a:fillRef idx="0">
+            <a:schemeClr val="accent1"/>
+          </a:fillRef>
+          <a:effectRef idx="0">
+            <a:schemeClr val="accent1"/>
+          </a:effectRef>
+          <a:fontRef idx="minor">
+            <a:schemeClr val="tx1"/>
+          </a:fontRef>
+        </p:style>
+      </p:cxnSp>
+      <p:sp>
+        <p:nvSpPr>
+          <p:cNvPr id="210" name="円柱 209"/>
+          <p:cNvSpPr/>
+          <p:nvPr/>
+        </p:nvSpPr>
+        <p:spPr>
+          <a:xfrm>
+            <a:off x="5276385" y="4118087"/>
+            <a:ext cx="881504" cy="504511"/>
+          </a:xfrm>
+          <a:prstGeom prst="can">
+            <a:avLst/>
+          </a:prstGeom>
+          <a:solidFill>
+            <a:schemeClr val="bg2"/>
+          </a:solidFill>
+          <a:ln>
+            <a:solidFill>
+              <a:schemeClr val="tx1">
+                <a:lumMod val="75000"/>
+                <a:lumOff val="25000"/>
+              </a:schemeClr>
+            </a:solidFill>
+          </a:ln>
+        </p:spPr>
+        <p:style>
+          <a:lnRef idx="2">
+            <a:schemeClr val="accent1">
+              <a:shade val="50000"/>
+            </a:schemeClr>
+          </a:lnRef>
+          <a:fillRef idx="1">
+            <a:schemeClr val="accent1"/>
+          </a:fillRef>
+          <a:effectRef idx="0">
+            <a:schemeClr val="accent1"/>
+          </a:effectRef>
+          <a:fontRef idx="minor">
+            <a:schemeClr val="lt1"/>
+          </a:fontRef>
+        </p:style>
+        <p:txBody>
+          <a:bodyPr rtlCol="0" anchor="ctr"/>
+          <a:lstStyle/>
+          <a:p>
+            <a:pPr algn="ctr"/>
+            <a:r>
+              <a:rPr lang="en-US" altLang="ja-JP" sz="1200" dirty="0">
+                <a:solidFill>
+                  <a:schemeClr val="tx1">
+                    <a:lumMod val="75000"/>
+                    <a:lumOff val="25000"/>
+                  </a:schemeClr>
+                </a:solidFill>
+              </a:rPr>
+              <a:t>F</a:t>
+            </a:r>
+            <a:r>
+              <a:rPr kumimoji="1" lang="en-US" altLang="ja-JP" sz="1200" dirty="0" smtClean="0">
+                <a:solidFill>
+                  <a:schemeClr val="tx1">
+                    <a:lumMod val="75000"/>
+                    <a:lumOff val="25000"/>
+                  </a:schemeClr>
+                </a:solidFill>
+              </a:rPr>
+              <a:t>eature</a:t>
+            </a:r>
+          </a:p>
+          <a:p>
+            <a:pPr algn="ctr"/>
+            <a:r>
+              <a:rPr lang="en-US" altLang="ja-JP" sz="1200" dirty="0" smtClean="0">
+                <a:solidFill>
+                  <a:schemeClr val="tx1">
+                    <a:lumMod val="75000"/>
+                    <a:lumOff val="25000"/>
+                  </a:schemeClr>
+                </a:solidFill>
+              </a:rPr>
+              <a:t>Data</a:t>
+            </a:r>
+            <a:endParaRPr kumimoji="1" lang="ja-JP" altLang="en-US" sz="1200" dirty="0">
+              <a:solidFill>
+                <a:schemeClr val="tx1">
+                  <a:lumMod val="75000"/>
+                  <a:lumOff val="25000"/>
+                </a:schemeClr>
+              </a:solidFill>
+            </a:endParaRPr>
+          </a:p>
+        </p:txBody>
+      </p:sp>
+      <p:cxnSp>
+        <p:nvCxnSpPr>
+          <p:cNvPr id="211" name="カギ線コネクタ 210"/>
+          <p:cNvCxnSpPr>
+            <a:stCxn id="210" idx="1"/>
+          </p:cNvCxnSpPr>
+          <p:nvPr/>
+        </p:nvCxnSpPr>
+        <p:spPr>
+          <a:xfrm rot="16200000" flipV="1">
+            <a:off x="5194412" y="3595362"/>
+            <a:ext cx="604699" cy="440752"/>
+          </a:xfrm>
+          <a:prstGeom prst="bentConnector3">
+            <a:avLst>
+              <a:gd name="adj1" fmla="val 50000"/>
+            </a:avLst>
+          </a:prstGeom>
+          <a:ln w="12700">
+            <a:solidFill>
+              <a:schemeClr val="tx1">
+                <a:lumMod val="75000"/>
+                <a:lumOff val="25000"/>
+              </a:schemeClr>
+            </a:solidFill>
+            <a:headEnd type="arrow"/>
+            <a:tailEnd type="none"/>
+          </a:ln>
+        </p:spPr>
+        <p:style>
+          <a:lnRef idx="1">
+            <a:schemeClr val="accent1"/>
+          </a:lnRef>
+          <a:fillRef idx="0">
+            <a:schemeClr val="accent1"/>
+          </a:fillRef>
+          <a:effectRef idx="0">
+            <a:schemeClr val="accent1"/>
+          </a:effectRef>
+          <a:fontRef idx="minor">
+            <a:schemeClr val="tx1"/>
+          </a:fontRef>
+        </p:style>
+      </p:cxnSp>
+      <p:sp>
+        <p:nvSpPr>
+          <p:cNvPr id="213" name="円柱 212"/>
+          <p:cNvSpPr/>
+          <p:nvPr/>
+        </p:nvSpPr>
+        <p:spPr>
+          <a:xfrm>
+            <a:off x="6425371" y="4109619"/>
+            <a:ext cx="881504" cy="504511"/>
+          </a:xfrm>
+          <a:prstGeom prst="can">
+            <a:avLst/>
+          </a:prstGeom>
+          <a:solidFill>
+            <a:schemeClr val="bg2"/>
+          </a:solidFill>
+          <a:ln>
+            <a:solidFill>
+              <a:schemeClr val="tx1">
+                <a:lumMod val="75000"/>
+                <a:lumOff val="25000"/>
+              </a:schemeClr>
+            </a:solidFill>
+          </a:ln>
+        </p:spPr>
+        <p:style>
+          <a:lnRef idx="2">
+            <a:schemeClr val="accent1">
+              <a:shade val="50000"/>
+            </a:schemeClr>
+          </a:lnRef>
+          <a:fillRef idx="1">
+            <a:schemeClr val="accent1"/>
+          </a:fillRef>
+          <a:effectRef idx="0">
+            <a:schemeClr val="accent1"/>
+          </a:effectRef>
+          <a:fontRef idx="minor">
+            <a:schemeClr val="lt1"/>
+          </a:fontRef>
+        </p:style>
+        <p:txBody>
+          <a:bodyPr rtlCol="0" anchor="ctr"/>
+          <a:lstStyle/>
+          <a:p>
+            <a:pPr algn="ctr"/>
+            <a:r>
+              <a:rPr lang="en-US" altLang="ja-JP" sz="1200" dirty="0" smtClean="0">
+                <a:solidFill>
+                  <a:schemeClr val="tx1">
+                    <a:lumMod val="75000"/>
+                    <a:lumOff val="25000"/>
+                  </a:schemeClr>
+                </a:solidFill>
+              </a:rPr>
+              <a:t>Model</a:t>
+            </a:r>
+            <a:endParaRPr kumimoji="1" lang="en-US" altLang="ja-JP" sz="1200" dirty="0" smtClean="0">
+              <a:solidFill>
+                <a:schemeClr val="tx1">
+                  <a:lumMod val="75000"/>
+                  <a:lumOff val="25000"/>
+                </a:schemeClr>
+              </a:solidFill>
+            </a:endParaRPr>
+          </a:p>
+          <a:p>
+            <a:pPr algn="ctr"/>
+            <a:r>
+              <a:rPr lang="en-US" altLang="ja-JP" sz="1200" dirty="0" smtClean="0">
+                <a:solidFill>
+                  <a:schemeClr val="tx1">
+                    <a:lumMod val="75000"/>
+                    <a:lumOff val="25000"/>
+                  </a:schemeClr>
+                </a:solidFill>
+              </a:rPr>
+              <a:t>Data</a:t>
+            </a:r>
+            <a:endParaRPr kumimoji="1" lang="ja-JP" altLang="en-US" sz="1200" dirty="0">
+              <a:solidFill>
+                <a:schemeClr val="tx1">
+                  <a:lumMod val="75000"/>
+                  <a:lumOff val="25000"/>
+                </a:schemeClr>
+              </a:solidFill>
+            </a:endParaRPr>
+          </a:p>
+        </p:txBody>
+      </p:sp>
+      <p:cxnSp>
+        <p:nvCxnSpPr>
+          <p:cNvPr id="214" name="カギ線コネクタ 213"/>
+          <p:cNvCxnSpPr>
+            <a:stCxn id="213" idx="1"/>
+          </p:cNvCxnSpPr>
+          <p:nvPr/>
+        </p:nvCxnSpPr>
+        <p:spPr>
+          <a:xfrm rot="16200000" flipV="1">
+            <a:off x="6426813" y="3670309"/>
+            <a:ext cx="560643" cy="317978"/>
+          </a:xfrm>
+          <a:prstGeom prst="bentConnector3">
+            <a:avLst>
+              <a:gd name="adj1" fmla="val 50000"/>
+            </a:avLst>
+          </a:prstGeom>
+          <a:ln w="12700">
+            <a:solidFill>
+              <a:schemeClr val="tx1">
+                <a:lumMod val="75000"/>
+                <a:lumOff val="25000"/>
+              </a:schemeClr>
+            </a:solidFill>
+            <a:headEnd type="arrow"/>
+            <a:tailEnd type="none"/>
+          </a:ln>
+        </p:spPr>
+        <p:style>
+          <a:lnRef idx="1">
+            <a:schemeClr val="accent1"/>
+          </a:lnRef>
+          <a:fillRef idx="0">
+            <a:schemeClr val="accent1"/>
+          </a:fillRef>
+          <a:effectRef idx="0">
+            <a:schemeClr val="accent1"/>
+          </a:effectRef>
+          <a:fontRef idx="minor">
+            <a:schemeClr val="tx1"/>
+          </a:fontRef>
+        </p:style>
+      </p:cxnSp>
+      <p:cxnSp>
+        <p:nvCxnSpPr>
+          <p:cNvPr id="219" name="カギ線コネクタ 218"/>
+          <p:cNvCxnSpPr/>
+          <p:nvPr/>
+        </p:nvCxnSpPr>
+        <p:spPr>
+          <a:xfrm rot="16200000" flipV="1">
+            <a:off x="6947241" y="4009723"/>
+            <a:ext cx="1408256" cy="472077"/>
+          </a:xfrm>
+          <a:prstGeom prst="bentConnector3">
+            <a:avLst>
+              <a:gd name="adj1" fmla="val 72768"/>
+            </a:avLst>
+          </a:prstGeom>
+          <a:ln w="12700">
+            <a:solidFill>
+              <a:schemeClr val="tx1">
+                <a:lumMod val="75000"/>
+                <a:lumOff val="25000"/>
+              </a:schemeClr>
+            </a:solidFill>
+            <a:headEnd type="arrow"/>
+            <a:tailEnd type="none"/>
+          </a:ln>
+        </p:spPr>
+        <p:style>
+          <a:lnRef idx="1">
+            <a:schemeClr val="accent1"/>
+          </a:lnRef>
+          <a:fillRef idx="0">
+            <a:schemeClr val="accent1"/>
+          </a:fillRef>
+          <a:effectRef idx="0">
+            <a:schemeClr val="accent1"/>
+          </a:effectRef>
+          <a:fontRef idx="minor">
+            <a:schemeClr val="tx1"/>
+          </a:fontRef>
+        </p:style>
+      </p:cxnSp>
+      <p:sp>
+        <p:nvSpPr>
+          <p:cNvPr id="223" name="円柱 222"/>
+          <p:cNvSpPr/>
+          <p:nvPr/>
+        </p:nvSpPr>
+        <p:spPr>
+          <a:xfrm>
+            <a:off x="7630993" y="4938243"/>
+            <a:ext cx="551106" cy="400754"/>
+          </a:xfrm>
+          <a:prstGeom prst="can">
+            <a:avLst/>
+          </a:prstGeom>
+          <a:solidFill>
+            <a:schemeClr val="bg2"/>
+          </a:solidFill>
+          <a:ln w="12700">
+            <a:solidFill>
+              <a:schemeClr val="tx1">
+                <a:lumMod val="75000"/>
+                <a:lumOff val="25000"/>
+              </a:schemeClr>
+            </a:solidFill>
+          </a:ln>
+        </p:spPr>
+        <p:style>
+          <a:lnRef idx="2">
+            <a:schemeClr val="accent1">
+              <a:shade val="50000"/>
+            </a:schemeClr>
+          </a:lnRef>
+          <a:fillRef idx="1">
+            <a:schemeClr val="accent1"/>
+          </a:fillRef>
+          <a:effectRef idx="0">
+            <a:schemeClr val="accent1"/>
+          </a:effectRef>
+          <a:fontRef idx="minor">
+            <a:schemeClr val="lt1"/>
+          </a:fontRef>
+        </p:style>
+        <p:txBody>
+          <a:bodyPr rtlCol="0" anchor="ctr"/>
+          <a:lstStyle/>
+          <a:p>
+            <a:pPr algn="ctr"/>
+            <a:r>
+              <a:rPr lang="en-US" altLang="ja-JP" sz="1050" dirty="0" smtClean="0">
+                <a:solidFill>
+                  <a:schemeClr val="tx1">
+                    <a:lumMod val="75000"/>
+                    <a:lumOff val="25000"/>
+                  </a:schemeClr>
+                </a:solidFill>
+              </a:rPr>
+              <a:t>Model</a:t>
+            </a:r>
+            <a:endParaRPr kumimoji="1" lang="en-US" altLang="ja-JP" sz="1050" dirty="0" smtClean="0">
+              <a:solidFill>
+                <a:schemeClr val="tx1">
+                  <a:lumMod val="75000"/>
+                  <a:lumOff val="25000"/>
+                </a:schemeClr>
+              </a:solidFill>
+            </a:endParaRPr>
+          </a:p>
+        </p:txBody>
+      </p:sp>
+      <p:sp>
+        <p:nvSpPr>
+          <p:cNvPr id="224" name="テキスト ボックス 223"/>
+          <p:cNvSpPr txBox="1"/>
+          <p:nvPr/>
+        </p:nvSpPr>
+        <p:spPr>
+          <a:xfrm>
+            <a:off x="7415330" y="3669951"/>
+            <a:ext cx="569621" cy="253916"/>
+          </a:xfrm>
+          <a:prstGeom prst="rect">
+            <a:avLst/>
+          </a:prstGeom>
+          <a:noFill/>
+        </p:spPr>
+        <p:txBody>
+          <a:bodyPr wrap="square" rtlCol="0">
+            <a:spAutoFit/>
+          </a:bodyPr>
+          <a:lstStyle/>
+          <a:p>
+            <a:r>
+              <a:rPr lang="en-US" altLang="ja-JP" sz="1050" dirty="0" smtClean="0">
+                <a:solidFill>
+                  <a:schemeClr val="tx1">
+                    <a:lumMod val="75000"/>
+                    <a:lumOff val="25000"/>
+                  </a:schemeClr>
+                </a:solidFill>
+              </a:rPr>
+              <a:t>Deploy</a:t>
+            </a:r>
+            <a:endParaRPr lang="en-US" altLang="ja-JP" sz="1050" dirty="0" smtClean="0">
+              <a:solidFill>
+                <a:schemeClr val="tx1">
+                  <a:lumMod val="75000"/>
+                  <a:lumOff val="25000"/>
+                </a:schemeClr>
+              </a:solidFill>
+            </a:endParaRPr>
+          </a:p>
+        </p:txBody>
+      </p:sp>
+      <p:cxnSp>
+        <p:nvCxnSpPr>
+          <p:cNvPr id="228" name="カギ線コネクタ 227"/>
+          <p:cNvCxnSpPr>
+            <a:stCxn id="172" idx="3"/>
+            <a:endCxn id="223" idx="3"/>
+          </p:cNvCxnSpPr>
+          <p:nvPr/>
+        </p:nvCxnSpPr>
+        <p:spPr>
+          <a:xfrm flipV="1">
+            <a:off x="7504354" y="5338997"/>
+            <a:ext cx="402192" cy="158922"/>
+          </a:xfrm>
+          <a:prstGeom prst="bentConnector2">
+            <a:avLst/>
+          </a:prstGeom>
+          <a:ln w="12700">
+            <a:solidFill>
+              <a:schemeClr val="tx1">
+                <a:lumMod val="75000"/>
+                <a:lumOff val="25000"/>
+              </a:schemeClr>
+            </a:solidFill>
+            <a:headEnd type="arrow"/>
+            <a:tailEnd type="none"/>
+          </a:ln>
+        </p:spPr>
+        <p:style>
+          <a:lnRef idx="1">
+            <a:schemeClr val="accent1"/>
+          </a:lnRef>
+          <a:fillRef idx="0">
+            <a:schemeClr val="accent1"/>
+          </a:fillRef>
+          <a:effectRef idx="0">
+            <a:schemeClr val="accent1"/>
+          </a:effectRef>
+          <a:fontRef idx="minor">
+            <a:schemeClr val="tx1"/>
+          </a:fontRef>
+        </p:style>
+      </p:cxnSp>
+      <p:sp>
+        <p:nvSpPr>
+          <p:cNvPr id="232" name="テキスト ボックス 231"/>
+          <p:cNvSpPr txBox="1"/>
+          <p:nvPr/>
+        </p:nvSpPr>
+        <p:spPr>
+          <a:xfrm>
+            <a:off x="1923645" y="5028789"/>
+            <a:ext cx="1994852" cy="338554"/>
+          </a:xfrm>
+          <a:prstGeom prst="rect">
+            <a:avLst/>
+          </a:prstGeom>
+          <a:noFill/>
+        </p:spPr>
+        <p:txBody>
+          <a:bodyPr wrap="square" rtlCol="0">
+            <a:spAutoFit/>
+          </a:bodyPr>
+          <a:lstStyle/>
+          <a:p>
+            <a:r>
+              <a:rPr lang="en-US" altLang="ja-JP" sz="1600" b="1" dirty="0" err="1">
+                <a:solidFill>
+                  <a:schemeClr val="tx1">
+                    <a:lumMod val="75000"/>
+                    <a:lumOff val="25000"/>
+                  </a:schemeClr>
+                </a:solidFill>
+              </a:rPr>
+              <a:t>Solr</a:t>
+            </a:r>
+            <a:r>
+              <a:rPr lang="en-US" altLang="ja-JP" sz="1600" b="1" dirty="0">
+                <a:solidFill>
+                  <a:schemeClr val="tx1">
+                    <a:lumMod val="75000"/>
+                    <a:lumOff val="25000"/>
+                  </a:schemeClr>
+                </a:solidFill>
+              </a:rPr>
+              <a:t> / </a:t>
+            </a:r>
+            <a:r>
+              <a:rPr lang="en-US" altLang="ja-JP" sz="1600" b="1" dirty="0" err="1">
+                <a:solidFill>
+                  <a:schemeClr val="tx1">
+                    <a:lumMod val="75000"/>
+                    <a:lumOff val="25000"/>
+                  </a:schemeClr>
+                </a:solidFill>
+              </a:rPr>
+              <a:t>Elasticsearch</a:t>
+            </a:r>
+            <a:endParaRPr lang="en-US" altLang="ja-JP" sz="1600" b="1" dirty="0">
+              <a:solidFill>
+                <a:schemeClr val="tx1">
+                  <a:lumMod val="75000"/>
+                  <a:lumOff val="25000"/>
+                </a:schemeClr>
+              </a:solidFill>
+            </a:endParaRPr>
+          </a:p>
+        </p:txBody>
+      </p:sp>
+      <p:sp>
+        <p:nvSpPr>
+          <p:cNvPr id="233" name="テキスト ボックス 232"/>
+          <p:cNvSpPr txBox="1"/>
+          <p:nvPr/>
+        </p:nvSpPr>
+        <p:spPr>
+          <a:xfrm>
+            <a:off x="4719251" y="3796909"/>
+            <a:ext cx="2302919" cy="415498"/>
+          </a:xfrm>
+          <a:prstGeom prst="rect">
+            <a:avLst/>
+          </a:prstGeom>
+          <a:noFill/>
+        </p:spPr>
+        <p:txBody>
+          <a:bodyPr wrap="square" rtlCol="0">
+            <a:spAutoFit/>
+          </a:bodyPr>
+          <a:lstStyle/>
+          <a:p>
+            <a:r>
+              <a:rPr lang="en-US" altLang="ja-JP" sz="1050" dirty="0" smtClean="0">
+                <a:solidFill>
+                  <a:schemeClr val="tx1">
+                    <a:lumMod val="75000"/>
+                    <a:lumOff val="25000"/>
+                  </a:schemeClr>
+                </a:solidFill>
+              </a:rPr>
+              <a:t>Extract</a:t>
+            </a:r>
+          </a:p>
+          <a:p>
+            <a:r>
+              <a:rPr lang="en-US" altLang="ja-JP" sz="1050" dirty="0" smtClean="0">
+                <a:solidFill>
+                  <a:schemeClr val="tx1">
+                    <a:lumMod val="75000"/>
+                    <a:lumOff val="25000"/>
+                  </a:schemeClr>
+                </a:solidFill>
+              </a:rPr>
+              <a:t>features</a:t>
+            </a:r>
+            <a:endParaRPr lang="en-US" altLang="ja-JP" sz="1050" dirty="0" smtClean="0">
+              <a:solidFill>
+                <a:schemeClr val="tx1">
+                  <a:lumMod val="75000"/>
+                  <a:lumOff val="25000"/>
+                </a:schemeClr>
+              </a:solidFill>
+            </a:endParaRPr>
+          </a:p>
+        </p:txBody>
+      </p:sp>
+      <p:cxnSp>
+        <p:nvCxnSpPr>
+          <p:cNvPr id="240" name="カギ線コネクタ 239"/>
+          <p:cNvCxnSpPr>
+            <a:stCxn id="232" idx="2"/>
+            <a:endCxn id="172" idx="1"/>
+          </p:cNvCxnSpPr>
+          <p:nvPr/>
+        </p:nvCxnSpPr>
+        <p:spPr>
+          <a:xfrm rot="16200000" flipH="1">
+            <a:off x="4361452" y="3926962"/>
+            <a:ext cx="130576" cy="3011338"/>
+          </a:xfrm>
+          <a:prstGeom prst="bentConnector2">
+            <a:avLst/>
+          </a:prstGeom>
+          <a:ln w="9525">
+            <a:solidFill>
+              <a:schemeClr val="tx1">
+                <a:lumMod val="75000"/>
+                <a:lumOff val="25000"/>
+              </a:schemeClr>
+            </a:solidFill>
+            <a:prstDash val="sysDash"/>
+            <a:headEnd type="arrow"/>
+            <a:tailEnd type="none"/>
+          </a:ln>
+        </p:spPr>
+        <p:style>
+          <a:lnRef idx="1">
+            <a:schemeClr val="accent1"/>
+          </a:lnRef>
+          <a:fillRef idx="0">
+            <a:schemeClr val="accent1"/>
+          </a:fillRef>
+          <a:effectRef idx="0">
+            <a:schemeClr val="accent1"/>
+          </a:effectRef>
+          <a:fontRef idx="minor">
+            <a:schemeClr val="tx1"/>
+          </a:fontRef>
+        </p:style>
+      </p:cxnSp>
+      <p:sp>
+        <p:nvSpPr>
+          <p:cNvPr id="243" name="テキスト ボックス 242"/>
+          <p:cNvSpPr txBox="1"/>
+          <p:nvPr/>
+        </p:nvSpPr>
+        <p:spPr>
+          <a:xfrm>
+            <a:off x="2889267" y="5441403"/>
+            <a:ext cx="569621" cy="253916"/>
+          </a:xfrm>
+          <a:prstGeom prst="rect">
+            <a:avLst/>
+          </a:prstGeom>
+          <a:noFill/>
+        </p:spPr>
+        <p:txBody>
+          <a:bodyPr wrap="square" rtlCol="0">
+            <a:spAutoFit/>
+          </a:bodyPr>
+          <a:lstStyle/>
+          <a:p>
+            <a:r>
+              <a:rPr lang="en-US" altLang="ja-JP" sz="1050" dirty="0" smtClean="0">
+                <a:solidFill>
+                  <a:schemeClr val="tx1">
+                    <a:lumMod val="75000"/>
+                    <a:lumOff val="25000"/>
+                  </a:schemeClr>
+                </a:solidFill>
+              </a:rPr>
+              <a:t>plugin</a:t>
+            </a:r>
+            <a:endParaRPr lang="en-US" altLang="ja-JP" sz="1050" dirty="0" smtClean="0">
+              <a:solidFill>
+                <a:schemeClr val="tx1">
+                  <a:lumMod val="75000"/>
+                  <a:lumOff val="25000"/>
+                </a:schemeClr>
+              </a:solidFill>
+            </a:endParaRPr>
+          </a:p>
+        </p:txBody>
+      </p:sp>
+      <p:sp>
+        <p:nvSpPr>
+          <p:cNvPr id="246" name="テキスト ボックス 245"/>
+          <p:cNvSpPr txBox="1"/>
+          <p:nvPr/>
+        </p:nvSpPr>
+        <p:spPr>
+          <a:xfrm>
+            <a:off x="5697625" y="5017853"/>
+            <a:ext cx="1152128" cy="261610"/>
+          </a:xfrm>
+          <a:prstGeom prst="rect">
+            <a:avLst/>
+          </a:prstGeom>
+          <a:noFill/>
+        </p:spPr>
+        <p:txBody>
+          <a:bodyPr wrap="square" rtlCol="0">
+            <a:spAutoFit/>
+          </a:bodyPr>
+          <a:lstStyle/>
+          <a:p>
+            <a:r>
+              <a:rPr lang="en-US" altLang="ja-JP" sz="1100" b="1" dirty="0" smtClean="0">
+                <a:solidFill>
+                  <a:schemeClr val="tx1">
+                    <a:lumMod val="75000"/>
+                    <a:lumOff val="25000"/>
+                  </a:schemeClr>
+                </a:solidFill>
+              </a:rPr>
+              <a:t>NLP4L-SOLR</a:t>
+            </a:r>
+            <a:endParaRPr lang="en-US" altLang="ja-JP" sz="1100" b="1" dirty="0" smtClean="0">
+              <a:solidFill>
+                <a:schemeClr val="tx1">
+                  <a:lumMod val="75000"/>
+                  <a:lumOff val="25000"/>
+                </a:schemeClr>
+              </a:solidFill>
+            </a:endParaRPr>
+          </a:p>
+        </p:txBody>
+      </p:sp>
+    </p:spTree>
+    <p:extLst>
+      <p:ext uri="{BB962C8B-B14F-4D97-AF65-F5344CB8AC3E}">
+        <p14:creationId xmlns:p14="http://schemas.microsoft.com/office/powerpoint/2010/main" val="2451759561"/>
+      </p:ext>
+    </p:extLst>
+  </p:cSld>
+  <p:clrMapOvr>
+    <a:masterClrMapping/>
+  </p:clrMapOvr>
+  <p:timing>
+    <p:tnLst>
+      <p:par>
+        <p:cTn id="1" dur="indefinite" restart="never" nodeType="tmRoot"/>
+      </p:par>
+    </p:tnLst>
+  </p:timing>
 </p:sld>
 </file>
 

</xml_diff>